<commit_message>
uploads layout-v1 xsd files
</commit_message>
<xml_diff>
--- a/content/_/img/home/causeway-logo.pptx
+++ b/content/_/img/home/causeway-logo.pptx
@@ -5,18 +5,19 @@
     <p:sldMasterId id="2147483780" r:id="rId1"/>
   </p:sldMasterIdLst>
   <p:notesMasterIdLst>
-    <p:notesMasterId r:id="rId11"/>
+    <p:notesMasterId r:id="rId12"/>
   </p:notesMasterIdLst>
   <p:sldIdLst>
     <p:sldId id="270" r:id="rId2"/>
-    <p:sldId id="281" r:id="rId3"/>
-    <p:sldId id="279" r:id="rId4"/>
-    <p:sldId id="280" r:id="rId5"/>
-    <p:sldId id="277" r:id="rId6"/>
-    <p:sldId id="278" r:id="rId7"/>
-    <p:sldId id="275" r:id="rId8"/>
-    <p:sldId id="276" r:id="rId9"/>
-    <p:sldId id="274" r:id="rId10"/>
+    <p:sldId id="279" r:id="rId3"/>
+    <p:sldId id="282" r:id="rId4"/>
+    <p:sldId id="281" r:id="rId5"/>
+    <p:sldId id="280" r:id="rId6"/>
+    <p:sldId id="277" r:id="rId7"/>
+    <p:sldId id="278" r:id="rId8"/>
+    <p:sldId id="275" r:id="rId9"/>
+    <p:sldId id="276" r:id="rId10"/>
+    <p:sldId id="274" r:id="rId11"/>
   </p:sldIdLst>
   <p:sldSz cx="5759450" cy="4279900"/>
   <p:notesSz cx="7077075" cy="9363075"/>
@@ -125,8 +126,9 @@
         </p14:section>
         <p14:section name="asf candidates" id="{426C8A0A-A020-45D3-A84C-61E4393A51A7}">
           <p14:sldIdLst>
+            <p14:sldId id="279"/>
+            <p14:sldId id="282"/>
             <p14:sldId id="281"/>
-            <p14:sldId id="279"/>
           </p14:sldIdLst>
         </p14:section>
         <p14:section name="asf version rejects" id="{3ADF3438-BA67-46F1-A802-4CFFB429484F}">
@@ -2254,7 +2256,7 @@
           <a:p>
             <a:fld id="{9CE68B46-7DAB-46E1-BB37-1AB0860C476C}" type="datetimeFigureOut">
               <a:rPr lang="en-GB" smtClean="0"/>
-              <a:t>23/02/2023</a:t>
+              <a:t>24/02/2023</a:t>
             </a:fld>
             <a:endParaRPr lang="en-GB"/>
           </a:p>
@@ -2653,7 +2655,7 @@
           <a:p>
             <a:fld id="{00FED85C-4F06-49A0-B339-8C08B1EAAF5D}" type="datetimeFigureOut">
               <a:rPr lang="en-GB" smtClean="0"/>
-              <a:t>23/02/2023</a:t>
+              <a:t>24/02/2023</a:t>
             </a:fld>
             <a:endParaRPr lang="en-GB"/>
           </a:p>
@@ -2823,7 +2825,7 @@
           <a:p>
             <a:fld id="{00FED85C-4F06-49A0-B339-8C08B1EAAF5D}" type="datetimeFigureOut">
               <a:rPr lang="en-GB" smtClean="0"/>
-              <a:t>23/02/2023</a:t>
+              <a:t>24/02/2023</a:t>
             </a:fld>
             <a:endParaRPr lang="en-GB"/>
           </a:p>
@@ -3003,7 +3005,7 @@
           <a:p>
             <a:fld id="{00FED85C-4F06-49A0-B339-8C08B1EAAF5D}" type="datetimeFigureOut">
               <a:rPr lang="en-GB" smtClean="0"/>
-              <a:t>23/02/2023</a:t>
+              <a:t>24/02/2023</a:t>
             </a:fld>
             <a:endParaRPr lang="en-GB"/>
           </a:p>
@@ -3173,7 +3175,7 @@
           <a:p>
             <a:fld id="{00FED85C-4F06-49A0-B339-8C08B1EAAF5D}" type="datetimeFigureOut">
               <a:rPr lang="en-GB" smtClean="0"/>
-              <a:t>23/02/2023</a:t>
+              <a:t>24/02/2023</a:t>
             </a:fld>
             <a:endParaRPr lang="en-GB"/>
           </a:p>
@@ -3417,7 +3419,7 @@
           <a:p>
             <a:fld id="{00FED85C-4F06-49A0-B339-8C08B1EAAF5D}" type="datetimeFigureOut">
               <a:rPr lang="en-GB" smtClean="0"/>
-              <a:t>23/02/2023</a:t>
+              <a:t>24/02/2023</a:t>
             </a:fld>
             <a:endParaRPr lang="en-GB"/>
           </a:p>
@@ -3649,7 +3651,7 @@
           <a:p>
             <a:fld id="{00FED85C-4F06-49A0-B339-8C08B1EAAF5D}" type="datetimeFigureOut">
               <a:rPr lang="en-GB" smtClean="0"/>
-              <a:t>23/02/2023</a:t>
+              <a:t>24/02/2023</a:t>
             </a:fld>
             <a:endParaRPr lang="en-GB"/>
           </a:p>
@@ -4016,7 +4018,7 @@
           <a:p>
             <a:fld id="{00FED85C-4F06-49A0-B339-8C08B1EAAF5D}" type="datetimeFigureOut">
               <a:rPr lang="en-GB" smtClean="0"/>
-              <a:t>23/02/2023</a:t>
+              <a:t>24/02/2023</a:t>
             </a:fld>
             <a:endParaRPr lang="en-GB"/>
           </a:p>
@@ -4134,7 +4136,7 @@
           <a:p>
             <a:fld id="{00FED85C-4F06-49A0-B339-8C08B1EAAF5D}" type="datetimeFigureOut">
               <a:rPr lang="en-GB" smtClean="0"/>
-              <a:t>23/02/2023</a:t>
+              <a:t>24/02/2023</a:t>
             </a:fld>
             <a:endParaRPr lang="en-GB"/>
           </a:p>
@@ -4229,7 +4231,7 @@
           <a:p>
             <a:fld id="{00FED85C-4F06-49A0-B339-8C08B1EAAF5D}" type="datetimeFigureOut">
               <a:rPr lang="en-GB" smtClean="0"/>
-              <a:t>23/02/2023</a:t>
+              <a:t>24/02/2023</a:t>
             </a:fld>
             <a:endParaRPr lang="en-GB"/>
           </a:p>
@@ -4506,7 +4508,7 @@
           <a:p>
             <a:fld id="{00FED85C-4F06-49A0-B339-8C08B1EAAF5D}" type="datetimeFigureOut">
               <a:rPr lang="en-GB" smtClean="0"/>
-              <a:t>23/02/2023</a:t>
+              <a:t>24/02/2023</a:t>
             </a:fld>
             <a:endParaRPr lang="en-GB"/>
           </a:p>
@@ -4763,7 +4765,7 @@
           <a:p>
             <a:fld id="{00FED85C-4F06-49A0-B339-8C08B1EAAF5D}" type="datetimeFigureOut">
               <a:rPr lang="en-GB" smtClean="0"/>
-              <a:t>23/02/2023</a:t>
+              <a:t>24/02/2023</a:t>
             </a:fld>
             <a:endParaRPr lang="en-GB"/>
           </a:p>
@@ -4976,7 +4978,7 @@
           <a:p>
             <a:fld id="{00FED85C-4F06-49A0-B339-8C08B1EAAF5D}" type="datetimeFigureOut">
               <a:rPr lang="en-GB" smtClean="0"/>
-              <a:t>23/02/2023</a:t>
+              <a:t>24/02/2023</a:t>
             </a:fld>
             <a:endParaRPr lang="en-GB"/>
           </a:p>
@@ -6143,7 +6145,7 @@
 </p:sld>
 </file>
 
-<file path=ppt/slides/slide2.xml><?xml version="1.0" encoding="utf-8"?>
+<file path=ppt/slides/slide10.xml><?xml version="1.0" encoding="utf-8"?>
 <p:sld xmlns:a="http://schemas.openxmlformats.org/drawingml/2006/main" xmlns:r="http://schemas.openxmlformats.org/officeDocument/2006/relationships" xmlns:p="http://schemas.openxmlformats.org/presentationml/2006/main">
   <p:cSld>
     <p:spTree>
@@ -6162,10 +6164,10 @@
       </p:grpSpPr>
       <p:sp>
         <p:nvSpPr>
-          <p:cNvPr id="5" name="Rectangle: Rounded Corners 4">
+          <p:cNvPr id="12" name="Rectangle: Rounded Corners 11">
             <a:extLst>
               <a:ext uri="{FF2B5EF4-FFF2-40B4-BE49-F238E27FC236}">
-                <a16:creationId xmlns:a16="http://schemas.microsoft.com/office/drawing/2014/main" id="{4035679B-9375-4A3B-9740-2D1E7E3D6445}"/>
+                <a16:creationId xmlns:a16="http://schemas.microsoft.com/office/drawing/2014/main" id="{A31F33E6-48C6-2F14-D301-2E0B7985B91A}"/>
               </a:ext>
             </a:extLst>
           </p:cNvPr>
@@ -6174,12 +6176,12 @@
         </p:nvSpPr>
         <p:spPr>
           <a:xfrm>
-            <a:off x="1" y="2888566"/>
-            <a:ext cx="965996" cy="1391334"/>
+            <a:off x="-1" y="-9238"/>
+            <a:ext cx="1392541" cy="2015741"/>
           </a:xfrm>
           <a:prstGeom prst="roundRect">
             <a:avLst>
-              <a:gd name="adj" fmla="val 0"/>
+              <a:gd name="adj" fmla="val 7098"/>
             </a:avLst>
           </a:prstGeom>
           <a:solidFill>
@@ -6220,64 +6222,6 @@
       </p:sp>
       <p:sp>
         <p:nvSpPr>
-          <p:cNvPr id="7" name="Rectangle: Rounded Corners 6">
-            <a:extLst>
-              <a:ext uri="{FF2B5EF4-FFF2-40B4-BE49-F238E27FC236}">
-                <a16:creationId xmlns:a16="http://schemas.microsoft.com/office/drawing/2014/main" id="{33E43F3B-B6E1-7210-879B-27AFE9595588}"/>
-              </a:ext>
-            </a:extLst>
-          </p:cNvPr>
-          <p:cNvSpPr/>
-          <p:nvPr/>
-        </p:nvSpPr>
-        <p:spPr>
-          <a:xfrm>
-            <a:off x="1" y="0"/>
-            <a:ext cx="965996" cy="2888566"/>
-          </a:xfrm>
-          <a:prstGeom prst="roundRect">
-            <a:avLst>
-              <a:gd name="adj" fmla="val 0"/>
-            </a:avLst>
-          </a:prstGeom>
-          <a:solidFill>
-            <a:srgbClr val="EEB4B3"/>
-          </a:solidFill>
-          <a:ln w="101600">
-            <a:noFill/>
-          </a:ln>
-        </p:spPr>
-        <p:style>
-          <a:lnRef idx="2">
-            <a:schemeClr val="accent1">
-              <a:shade val="50000"/>
-            </a:schemeClr>
-          </a:lnRef>
-          <a:fillRef idx="1">
-            <a:schemeClr val="accent1"/>
-          </a:fillRef>
-          <a:effectRef idx="0">
-            <a:schemeClr val="accent1"/>
-          </a:effectRef>
-          <a:fontRef idx="minor">
-            <a:schemeClr val="lt1"/>
-          </a:fontRef>
-        </p:style>
-        <p:txBody>
-          <a:bodyPr rtlCol="0" anchor="ctr"/>
-          <a:lstStyle/>
-          <a:p>
-            <a:pPr algn="ctr"/>
-            <a:endParaRPr lang="en-GB" sz="1808">
-              <a:solidFill>
-                <a:srgbClr val="95BFE5"/>
-              </a:solidFill>
-            </a:endParaRPr>
-          </a:p>
-        </p:txBody>
-      </p:sp>
-      <p:sp>
-        <p:nvSpPr>
           <p:cNvPr id="6" name="Rectangle: Rounded Corners 5">
             <a:extLst>
               <a:ext uri="{FF2B5EF4-FFF2-40B4-BE49-F238E27FC236}">
@@ -6290,1720 +6234,8 @@
         </p:nvSpPr>
         <p:spPr>
           <a:xfrm>
-            <a:off x="965997" y="2888563"/>
-            <a:ext cx="4793997" cy="1391335"/>
-          </a:xfrm>
-          <a:prstGeom prst="roundRect">
-            <a:avLst>
-              <a:gd name="adj" fmla="val 0"/>
-            </a:avLst>
-          </a:prstGeom>
-          <a:solidFill>
-            <a:srgbClr val="7A263A"/>
-          </a:solidFill>
-          <a:ln w="101600">
-            <a:noFill/>
-          </a:ln>
-        </p:spPr>
-        <p:style>
-          <a:lnRef idx="2">
-            <a:schemeClr val="accent1">
-              <a:shade val="50000"/>
-            </a:schemeClr>
-          </a:lnRef>
-          <a:fillRef idx="1">
-            <a:schemeClr val="accent1"/>
-          </a:fillRef>
-          <a:effectRef idx="0">
-            <a:schemeClr val="accent1"/>
-          </a:effectRef>
-          <a:fontRef idx="minor">
-            <a:schemeClr val="lt1"/>
-          </a:fontRef>
-        </p:style>
-        <p:txBody>
-          <a:bodyPr rtlCol="0" anchor="ctr"/>
-          <a:lstStyle/>
-          <a:p>
-            <a:pPr algn="ctr"/>
-            <a:endParaRPr lang="en-GB" sz="1808">
-              <a:solidFill>
-                <a:srgbClr val="95BFE5"/>
-              </a:solidFill>
-            </a:endParaRPr>
-          </a:p>
-        </p:txBody>
-      </p:sp>
-      <p:sp>
-        <p:nvSpPr>
-          <p:cNvPr id="2" name="TextBox 1">
-            <a:extLst>
-              <a:ext uri="{FF2B5EF4-FFF2-40B4-BE49-F238E27FC236}">
-                <a16:creationId xmlns:a16="http://schemas.microsoft.com/office/drawing/2014/main" id="{4D875408-3E42-5D08-7FED-62C7D1F59918}"/>
-              </a:ext>
-            </a:extLst>
-          </p:cNvPr>
-          <p:cNvSpPr txBox="1"/>
-          <p:nvPr/>
-        </p:nvSpPr>
-        <p:spPr>
-          <a:xfrm rot="16200000">
-            <a:off x="-567708" y="1808118"/>
-            <a:ext cx="2262759" cy="1446550"/>
-          </a:xfrm>
-          <a:prstGeom prst="rect">
-            <a:avLst/>
-          </a:prstGeom>
-          <a:noFill/>
-        </p:spPr>
-        <p:txBody>
-          <a:bodyPr wrap="square" rtlCol="0">
-            <a:spAutoFit/>
-          </a:bodyPr>
-          <a:lstStyle/>
-          <a:p>
-            <a:r>
-              <a:rPr lang="en-GB" sz="8800" b="1">
-                <a:solidFill>
-                  <a:schemeClr val="bg1"/>
-                </a:solidFill>
-                <a:latin typeface="Android Insomnia" pitchFamily="2" charset="-128"/>
-                <a:ea typeface="Android Insomnia" pitchFamily="2" charset="-128"/>
-                <a:cs typeface="Android Insomnia" pitchFamily="2" charset="-128"/>
-              </a:rPr>
-              <a:t>asf</a:t>
-            </a:r>
-          </a:p>
-        </p:txBody>
-      </p:sp>
-      <p:sp>
-        <p:nvSpPr>
-          <p:cNvPr id="4" name="Rectangle: Rounded Corners 3">
-            <a:extLst>
-              <a:ext uri="{FF2B5EF4-FFF2-40B4-BE49-F238E27FC236}">
-                <a16:creationId xmlns:a16="http://schemas.microsoft.com/office/drawing/2014/main" id="{CAC95C35-1B48-AA1E-545D-C3E97BCC7321}"/>
-              </a:ext>
-            </a:extLst>
-          </p:cNvPr>
-          <p:cNvSpPr/>
-          <p:nvPr/>
-        </p:nvSpPr>
-        <p:spPr>
-          <a:xfrm>
-            <a:off x="965997" y="0"/>
-            <a:ext cx="4793452" cy="2888563"/>
-          </a:xfrm>
-          <a:prstGeom prst="roundRect">
-            <a:avLst>
-              <a:gd name="adj" fmla="val 0"/>
-            </a:avLst>
-          </a:prstGeom>
-          <a:solidFill>
-            <a:srgbClr val="FEC601"/>
-          </a:solidFill>
-          <a:ln w="101600">
-            <a:noFill/>
-          </a:ln>
-        </p:spPr>
-        <p:style>
-          <a:lnRef idx="2">
-            <a:schemeClr val="accent1">
-              <a:shade val="50000"/>
-            </a:schemeClr>
-          </a:lnRef>
-          <a:fillRef idx="1">
-            <a:schemeClr val="accent1"/>
-          </a:fillRef>
-          <a:effectRef idx="0">
-            <a:schemeClr val="accent1"/>
-          </a:effectRef>
-          <a:fontRef idx="minor">
-            <a:schemeClr val="lt1"/>
-          </a:fontRef>
-        </p:style>
-        <p:txBody>
-          <a:bodyPr rtlCol="0" anchor="ctr"/>
-          <a:lstStyle/>
-          <a:p>
-            <a:pPr algn="ctr"/>
-            <a:endParaRPr lang="en-GB" sz="1808">
-              <a:solidFill>
-                <a:srgbClr val="95BFE5"/>
-              </a:solidFill>
-            </a:endParaRPr>
-          </a:p>
-        </p:txBody>
-      </p:sp>
-      <p:sp>
-        <p:nvSpPr>
-          <p:cNvPr id="3" name="TextBox 2">
-            <a:extLst>
-              <a:ext uri="{FF2B5EF4-FFF2-40B4-BE49-F238E27FC236}">
-                <a16:creationId xmlns:a16="http://schemas.microsoft.com/office/drawing/2014/main" id="{56BA9D04-7576-0017-8F07-92AFBC13D6A6}"/>
-              </a:ext>
-            </a:extLst>
-          </p:cNvPr>
-          <p:cNvSpPr txBox="1"/>
-          <p:nvPr/>
-        </p:nvSpPr>
-        <p:spPr>
-          <a:xfrm>
-            <a:off x="188643" y="2444114"/>
-            <a:ext cx="5675652" cy="1446550"/>
-          </a:xfrm>
-          <a:prstGeom prst="rect">
-            <a:avLst/>
-          </a:prstGeom>
-          <a:noFill/>
-        </p:spPr>
-        <p:txBody>
-          <a:bodyPr wrap="square" rtlCol="0">
-            <a:spAutoFit/>
-          </a:bodyPr>
-          <a:lstStyle/>
-          <a:p>
-            <a:r>
-              <a:rPr lang="en-GB" sz="8800" b="1">
-                <a:solidFill>
-                  <a:schemeClr val="bg1"/>
-                </a:solidFill>
-                <a:latin typeface="Android Insomnia" pitchFamily="2" charset="-128"/>
-                <a:ea typeface="Android Insomnia" pitchFamily="2" charset="-128"/>
-                <a:cs typeface="Android Insomnia" pitchFamily="2" charset="-128"/>
-              </a:rPr>
-              <a:t>causeway</a:t>
-            </a:r>
-            <a:endParaRPr lang="en-GB" sz="8800" b="1">
-              <a:solidFill>
-                <a:srgbClr val="7A263A"/>
-              </a:solidFill>
-              <a:latin typeface="Android Insomnia" pitchFamily="2" charset="-128"/>
-              <a:ea typeface="Android Insomnia" pitchFamily="2" charset="-128"/>
-              <a:cs typeface="Android Insomnia" pitchFamily="2" charset="-128"/>
-            </a:endParaRPr>
-          </a:p>
-        </p:txBody>
-      </p:sp>
-    </p:spTree>
-    <p:extLst>
-      <p:ext uri="{BB962C8B-B14F-4D97-AF65-F5344CB8AC3E}">
-        <p14:creationId xmlns:p14="http://schemas.microsoft.com/office/powerpoint/2010/main" val="801946939"/>
-      </p:ext>
-    </p:extLst>
-  </p:cSld>
-  <p:clrMapOvr>
-    <a:masterClrMapping/>
-  </p:clrMapOvr>
-</p:sld>
-</file>
-
-<file path=ppt/slides/slide3.xml><?xml version="1.0" encoding="utf-8"?>
-<p:sld xmlns:a="http://schemas.openxmlformats.org/drawingml/2006/main" xmlns:r="http://schemas.openxmlformats.org/officeDocument/2006/relationships" xmlns:p="http://schemas.openxmlformats.org/presentationml/2006/main">
-  <p:cSld>
-    <p:spTree>
-      <p:nvGrpSpPr>
-        <p:cNvPr id="1" name=""/>
-        <p:cNvGrpSpPr/>
-        <p:nvPr/>
-      </p:nvGrpSpPr>
-      <p:grpSpPr>
-        <a:xfrm>
-          <a:off x="0" y="0"/>
-          <a:ext cx="0" cy="0"/>
-          <a:chOff x="0" y="0"/>
-          <a:chExt cx="0" cy="0"/>
-        </a:xfrm>
-      </p:grpSpPr>
-      <p:sp>
-        <p:nvSpPr>
-          <p:cNvPr id="12" name="Rectangle: Rounded Corners 11">
-            <a:extLst>
-              <a:ext uri="{FF2B5EF4-FFF2-40B4-BE49-F238E27FC236}">
-                <a16:creationId xmlns:a16="http://schemas.microsoft.com/office/drawing/2014/main" id="{A31F33E6-48C6-2F14-D301-2E0B7985B91A}"/>
-              </a:ext>
-            </a:extLst>
-          </p:cNvPr>
-          <p:cNvSpPr/>
-          <p:nvPr/>
-        </p:nvSpPr>
-        <p:spPr>
-          <a:xfrm>
-            <a:off x="0" y="-6980"/>
-            <a:ext cx="1138136" cy="2509736"/>
-          </a:xfrm>
-          <a:prstGeom prst="roundRect">
-            <a:avLst>
-              <a:gd name="adj" fmla="val 0"/>
-            </a:avLst>
-          </a:prstGeom>
-          <a:solidFill>
-            <a:srgbClr val="EEB4B3"/>
-          </a:solidFill>
-          <a:ln w="101600">
-            <a:noFill/>
-          </a:ln>
-        </p:spPr>
-        <p:style>
-          <a:lnRef idx="2">
-            <a:schemeClr val="accent1">
-              <a:shade val="50000"/>
-            </a:schemeClr>
-          </a:lnRef>
-          <a:fillRef idx="1">
-            <a:schemeClr val="accent1"/>
-          </a:fillRef>
-          <a:effectRef idx="0">
-            <a:schemeClr val="accent1"/>
-          </a:effectRef>
-          <a:fontRef idx="minor">
-            <a:schemeClr val="lt1"/>
-          </a:fontRef>
-        </p:style>
-        <p:txBody>
-          <a:bodyPr rtlCol="0" anchor="ctr"/>
-          <a:lstStyle/>
-          <a:p>
-            <a:pPr algn="ctr"/>
-            <a:endParaRPr lang="en-GB" sz="1808">
-              <a:solidFill>
-                <a:srgbClr val="95BFE5"/>
-              </a:solidFill>
-            </a:endParaRPr>
-          </a:p>
-        </p:txBody>
-      </p:sp>
-      <p:sp>
-        <p:nvSpPr>
-          <p:cNvPr id="6" name="Rectangle: Rounded Corners 5">
-            <a:extLst>
-              <a:ext uri="{FF2B5EF4-FFF2-40B4-BE49-F238E27FC236}">
-                <a16:creationId xmlns:a16="http://schemas.microsoft.com/office/drawing/2014/main" id="{FEC4D2F5-1B5F-8B94-75B0-128AD20C2F6A}"/>
-              </a:ext>
-            </a:extLst>
-          </p:cNvPr>
-          <p:cNvSpPr/>
-          <p:nvPr/>
-        </p:nvSpPr>
-        <p:spPr>
-          <a:xfrm>
-            <a:off x="1175372" y="2544866"/>
-            <a:ext cx="4584078" cy="1735034"/>
-          </a:xfrm>
-          <a:prstGeom prst="roundRect">
-            <a:avLst>
-              <a:gd name="adj" fmla="val 0"/>
-            </a:avLst>
-          </a:prstGeom>
-          <a:solidFill>
-            <a:srgbClr val="7A263A"/>
-          </a:solidFill>
-          <a:ln w="101600">
-            <a:noFill/>
-          </a:ln>
-        </p:spPr>
-        <p:style>
-          <a:lnRef idx="2">
-            <a:schemeClr val="accent1">
-              <a:shade val="50000"/>
-            </a:schemeClr>
-          </a:lnRef>
-          <a:fillRef idx="1">
-            <a:schemeClr val="accent1"/>
-          </a:fillRef>
-          <a:effectRef idx="0">
-            <a:schemeClr val="accent1"/>
-          </a:effectRef>
-          <a:fontRef idx="minor">
-            <a:schemeClr val="lt1"/>
-          </a:fontRef>
-        </p:style>
-        <p:txBody>
-          <a:bodyPr rtlCol="0" anchor="ctr"/>
-          <a:lstStyle/>
-          <a:p>
-            <a:pPr algn="ctr"/>
-            <a:endParaRPr lang="en-GB" sz="1808">
-              <a:solidFill>
-                <a:srgbClr val="95BFE5"/>
-              </a:solidFill>
-            </a:endParaRPr>
-          </a:p>
-        </p:txBody>
-      </p:sp>
-      <p:sp>
-        <p:nvSpPr>
-          <p:cNvPr id="4" name="Rectangle: Rounded Corners 3">
-            <a:extLst>
-              <a:ext uri="{FF2B5EF4-FFF2-40B4-BE49-F238E27FC236}">
-                <a16:creationId xmlns:a16="http://schemas.microsoft.com/office/drawing/2014/main" id="{CAC95C35-1B48-AA1E-545D-C3E97BCC7321}"/>
-              </a:ext>
-            </a:extLst>
-          </p:cNvPr>
-          <p:cNvSpPr/>
-          <p:nvPr/>
-        </p:nvSpPr>
-        <p:spPr>
-          <a:xfrm>
-            <a:off x="1175372" y="0"/>
-            <a:ext cx="4584078" cy="2502756"/>
-          </a:xfrm>
-          <a:prstGeom prst="roundRect">
-            <a:avLst>
-              <a:gd name="adj" fmla="val 0"/>
-            </a:avLst>
-          </a:prstGeom>
-          <a:solidFill>
-            <a:srgbClr val="FEC601"/>
-          </a:solidFill>
-          <a:ln w="101600">
-            <a:noFill/>
-          </a:ln>
-        </p:spPr>
-        <p:style>
-          <a:lnRef idx="2">
-            <a:schemeClr val="accent1">
-              <a:shade val="50000"/>
-            </a:schemeClr>
-          </a:lnRef>
-          <a:fillRef idx="1">
-            <a:schemeClr val="accent1"/>
-          </a:fillRef>
-          <a:effectRef idx="0">
-            <a:schemeClr val="accent1"/>
-          </a:effectRef>
-          <a:fontRef idx="minor">
-            <a:schemeClr val="lt1"/>
-          </a:fontRef>
-        </p:style>
-        <p:txBody>
-          <a:bodyPr rtlCol="0" anchor="ctr"/>
-          <a:lstStyle/>
-          <a:p>
-            <a:pPr algn="ctr"/>
-            <a:endParaRPr lang="en-GB" sz="1808">
-              <a:solidFill>
-                <a:srgbClr val="95BFE5"/>
-              </a:solidFill>
-            </a:endParaRPr>
-          </a:p>
-        </p:txBody>
-      </p:sp>
-      <p:sp>
-        <p:nvSpPr>
-          <p:cNvPr id="5" name="Rectangle: Rounded Corners 4">
-            <a:extLst>
-              <a:ext uri="{FF2B5EF4-FFF2-40B4-BE49-F238E27FC236}">
-                <a16:creationId xmlns:a16="http://schemas.microsoft.com/office/drawing/2014/main" id="{4035679B-9375-4A3B-9740-2D1E7E3D6445}"/>
-              </a:ext>
-            </a:extLst>
-          </p:cNvPr>
-          <p:cNvSpPr/>
-          <p:nvPr/>
-        </p:nvSpPr>
-        <p:spPr>
-          <a:xfrm>
-            <a:off x="0" y="2544866"/>
-            <a:ext cx="1138136" cy="1735034"/>
-          </a:xfrm>
-          <a:prstGeom prst="roundRect">
-            <a:avLst>
-              <a:gd name="adj" fmla="val 0"/>
-            </a:avLst>
-          </a:prstGeom>
-          <a:solidFill>
-            <a:srgbClr val="5AB1BB"/>
-          </a:solidFill>
-          <a:ln w="101600">
-            <a:noFill/>
-          </a:ln>
-        </p:spPr>
-        <p:style>
-          <a:lnRef idx="2">
-            <a:schemeClr val="accent1">
-              <a:shade val="50000"/>
-            </a:schemeClr>
-          </a:lnRef>
-          <a:fillRef idx="1">
-            <a:schemeClr val="accent1"/>
-          </a:fillRef>
-          <a:effectRef idx="0">
-            <a:schemeClr val="accent1"/>
-          </a:effectRef>
-          <a:fontRef idx="minor">
-            <a:schemeClr val="lt1"/>
-          </a:fontRef>
-        </p:style>
-        <p:txBody>
-          <a:bodyPr rtlCol="0" anchor="ctr"/>
-          <a:lstStyle/>
-          <a:p>
-            <a:pPr algn="ctr"/>
-            <a:endParaRPr lang="en-GB" sz="1808">
-              <a:solidFill>
-                <a:srgbClr val="95BFE5"/>
-              </a:solidFill>
-            </a:endParaRPr>
-          </a:p>
-        </p:txBody>
-      </p:sp>
-      <p:sp>
-        <p:nvSpPr>
-          <p:cNvPr id="3" name="TextBox 2">
-            <a:extLst>
-              <a:ext uri="{FF2B5EF4-FFF2-40B4-BE49-F238E27FC236}">
-                <a16:creationId xmlns:a16="http://schemas.microsoft.com/office/drawing/2014/main" id="{56BA9D04-7576-0017-8F07-92AFBC13D6A6}"/>
-              </a:ext>
-            </a:extLst>
-          </p:cNvPr>
-          <p:cNvSpPr txBox="1"/>
-          <p:nvPr/>
-        </p:nvSpPr>
-        <p:spPr>
-          <a:xfrm>
-            <a:off x="1162900" y="2351235"/>
-            <a:ext cx="4584078" cy="1200329"/>
-          </a:xfrm>
-          <a:prstGeom prst="rect">
-            <a:avLst/>
-          </a:prstGeom>
-          <a:noFill/>
-        </p:spPr>
-        <p:txBody>
-          <a:bodyPr wrap="square" rtlCol="0">
-            <a:spAutoFit/>
-          </a:bodyPr>
-          <a:lstStyle/>
-          <a:p>
-            <a:r>
-              <a:rPr lang="en-GB" sz="7200" b="1">
-                <a:solidFill>
-                  <a:schemeClr val="bg1"/>
-                </a:solidFill>
-                <a:latin typeface="Android Insomnia" pitchFamily="2" charset="-128"/>
-                <a:ea typeface="Android Insomnia" pitchFamily="2" charset="-128"/>
-                <a:cs typeface="Android Insomnia" pitchFamily="2" charset="-128"/>
-              </a:rPr>
-              <a:t>causeway</a:t>
-            </a:r>
-          </a:p>
-        </p:txBody>
-      </p:sp>
-      <p:sp>
-        <p:nvSpPr>
-          <p:cNvPr id="10" name="TextBox 9">
-            <a:extLst>
-              <a:ext uri="{FF2B5EF4-FFF2-40B4-BE49-F238E27FC236}">
-                <a16:creationId xmlns:a16="http://schemas.microsoft.com/office/drawing/2014/main" id="{C64F2FFB-CDB5-6BCD-6256-EE2A05FDCE17}"/>
-              </a:ext>
-            </a:extLst>
-          </p:cNvPr>
-          <p:cNvSpPr txBox="1"/>
-          <p:nvPr/>
-        </p:nvSpPr>
-        <p:spPr>
-          <a:xfrm>
-            <a:off x="-75188" y="1760070"/>
-            <a:ext cx="1336806" cy="830997"/>
-          </a:xfrm>
-          <a:prstGeom prst="rect">
-            <a:avLst/>
-          </a:prstGeom>
-          <a:noFill/>
-        </p:spPr>
-        <p:txBody>
-          <a:bodyPr wrap="square" rtlCol="0">
-            <a:spAutoFit/>
-          </a:bodyPr>
-          <a:lstStyle/>
-          <a:p>
-            <a:r>
-              <a:rPr lang="en-US" sz="4800" b="1">
-                <a:solidFill>
-                  <a:schemeClr val="bg1"/>
-                </a:solidFill>
-                <a:latin typeface="Android Insomnia" pitchFamily="2" charset="-128"/>
-                <a:ea typeface="Android Insomnia" pitchFamily="2" charset="-128"/>
-                <a:cs typeface="Android Insomnia" pitchFamily="2" charset="-128"/>
-              </a:rPr>
-              <a:t>asf</a:t>
-            </a:r>
-            <a:endParaRPr lang="en-GB" sz="4800" b="1">
-              <a:solidFill>
-                <a:schemeClr val="bg1"/>
-              </a:solidFill>
-              <a:latin typeface="Android Insomnia" pitchFamily="2" charset="-128"/>
-              <a:ea typeface="Android Insomnia" pitchFamily="2" charset="-128"/>
-              <a:cs typeface="Android Insomnia" pitchFamily="2" charset="-128"/>
-            </a:endParaRPr>
-          </a:p>
-        </p:txBody>
-      </p:sp>
-    </p:spTree>
-    <p:extLst>
-      <p:ext uri="{BB962C8B-B14F-4D97-AF65-F5344CB8AC3E}">
-        <p14:creationId xmlns:p14="http://schemas.microsoft.com/office/powerpoint/2010/main" val="237684728"/>
-      </p:ext>
-    </p:extLst>
-  </p:cSld>
-  <p:clrMapOvr>
-    <a:masterClrMapping/>
-  </p:clrMapOvr>
-</p:sld>
-</file>
-
-<file path=ppt/slides/slide4.xml><?xml version="1.0" encoding="utf-8"?>
-<p:sld xmlns:a="http://schemas.openxmlformats.org/drawingml/2006/main" xmlns:r="http://schemas.openxmlformats.org/officeDocument/2006/relationships" xmlns:p="http://schemas.openxmlformats.org/presentationml/2006/main">
-  <p:cSld>
-    <p:spTree>
-      <p:nvGrpSpPr>
-        <p:cNvPr id="1" name=""/>
-        <p:cNvGrpSpPr/>
-        <p:nvPr/>
-      </p:nvGrpSpPr>
-      <p:grpSpPr>
-        <a:xfrm>
-          <a:off x="0" y="0"/>
-          <a:ext cx="0" cy="0"/>
-          <a:chOff x="0" y="0"/>
-          <a:chExt cx="0" cy="0"/>
-        </a:xfrm>
-      </p:grpSpPr>
-      <p:sp>
-        <p:nvSpPr>
-          <p:cNvPr id="12" name="Rectangle: Rounded Corners 11">
-            <a:extLst>
-              <a:ext uri="{FF2B5EF4-FFF2-40B4-BE49-F238E27FC236}">
-                <a16:creationId xmlns:a16="http://schemas.microsoft.com/office/drawing/2014/main" id="{A31F33E6-48C6-2F14-D301-2E0B7985B91A}"/>
-              </a:ext>
-            </a:extLst>
-          </p:cNvPr>
-          <p:cNvSpPr/>
-          <p:nvPr/>
-        </p:nvSpPr>
-        <p:spPr>
-          <a:xfrm>
-            <a:off x="0" y="0"/>
-            <a:ext cx="1138136" cy="2509736"/>
-          </a:xfrm>
-          <a:prstGeom prst="roundRect">
-            <a:avLst>
-              <a:gd name="adj" fmla="val 0"/>
-            </a:avLst>
-          </a:prstGeom>
-          <a:solidFill>
-            <a:srgbClr val="EEB4B3"/>
-          </a:solidFill>
-          <a:ln w="101600">
-            <a:noFill/>
-          </a:ln>
-        </p:spPr>
-        <p:style>
-          <a:lnRef idx="2">
-            <a:schemeClr val="accent1">
-              <a:shade val="50000"/>
-            </a:schemeClr>
-          </a:lnRef>
-          <a:fillRef idx="1">
-            <a:schemeClr val="accent1"/>
-          </a:fillRef>
-          <a:effectRef idx="0">
-            <a:schemeClr val="accent1"/>
-          </a:effectRef>
-          <a:fontRef idx="minor">
-            <a:schemeClr val="lt1"/>
-          </a:fontRef>
-        </p:style>
-        <p:txBody>
-          <a:bodyPr rtlCol="0" anchor="ctr"/>
-          <a:lstStyle/>
-          <a:p>
-            <a:pPr algn="ctr"/>
-            <a:endParaRPr lang="en-GB" sz="1808">
-              <a:solidFill>
-                <a:srgbClr val="95BFE5"/>
-              </a:solidFill>
-            </a:endParaRPr>
-          </a:p>
-        </p:txBody>
-      </p:sp>
-      <p:sp>
-        <p:nvSpPr>
-          <p:cNvPr id="6" name="Rectangle: Rounded Corners 5">
-            <a:extLst>
-              <a:ext uri="{FF2B5EF4-FFF2-40B4-BE49-F238E27FC236}">
-                <a16:creationId xmlns:a16="http://schemas.microsoft.com/office/drawing/2014/main" id="{FEC4D2F5-1B5F-8B94-75B0-128AD20C2F6A}"/>
-              </a:ext>
-            </a:extLst>
-          </p:cNvPr>
-          <p:cNvSpPr/>
-          <p:nvPr/>
-        </p:nvSpPr>
-        <p:spPr>
-          <a:xfrm>
-            <a:off x="1175372" y="2544866"/>
-            <a:ext cx="4584078" cy="1735034"/>
-          </a:xfrm>
-          <a:prstGeom prst="roundRect">
-            <a:avLst>
-              <a:gd name="adj" fmla="val 0"/>
-            </a:avLst>
-          </a:prstGeom>
-          <a:solidFill>
-            <a:srgbClr val="7A263A"/>
-          </a:solidFill>
-          <a:ln w="101600">
-            <a:noFill/>
-          </a:ln>
-        </p:spPr>
-        <p:style>
-          <a:lnRef idx="2">
-            <a:schemeClr val="accent1">
-              <a:shade val="50000"/>
-            </a:schemeClr>
-          </a:lnRef>
-          <a:fillRef idx="1">
-            <a:schemeClr val="accent1"/>
-          </a:fillRef>
-          <a:effectRef idx="0">
-            <a:schemeClr val="accent1"/>
-          </a:effectRef>
-          <a:fontRef idx="minor">
-            <a:schemeClr val="lt1"/>
-          </a:fontRef>
-        </p:style>
-        <p:txBody>
-          <a:bodyPr rtlCol="0" anchor="ctr"/>
-          <a:lstStyle/>
-          <a:p>
-            <a:pPr algn="ctr"/>
-            <a:endParaRPr lang="en-GB" sz="1808">
-              <a:solidFill>
-                <a:srgbClr val="95BFE5"/>
-              </a:solidFill>
-            </a:endParaRPr>
-          </a:p>
-        </p:txBody>
-      </p:sp>
-      <p:sp>
-        <p:nvSpPr>
-          <p:cNvPr id="4" name="Rectangle: Rounded Corners 3">
-            <a:extLst>
-              <a:ext uri="{FF2B5EF4-FFF2-40B4-BE49-F238E27FC236}">
-                <a16:creationId xmlns:a16="http://schemas.microsoft.com/office/drawing/2014/main" id="{CAC95C35-1B48-AA1E-545D-C3E97BCC7321}"/>
-              </a:ext>
-            </a:extLst>
-          </p:cNvPr>
-          <p:cNvSpPr/>
-          <p:nvPr/>
-        </p:nvSpPr>
-        <p:spPr>
-          <a:xfrm>
-            <a:off x="1175372" y="-13959"/>
-            <a:ext cx="4584078" cy="2516715"/>
-          </a:xfrm>
-          <a:prstGeom prst="roundRect">
-            <a:avLst>
-              <a:gd name="adj" fmla="val 0"/>
-            </a:avLst>
-          </a:prstGeom>
-          <a:solidFill>
-            <a:srgbClr val="FEC601"/>
-          </a:solidFill>
-          <a:ln w="101600">
-            <a:noFill/>
-          </a:ln>
-        </p:spPr>
-        <p:style>
-          <a:lnRef idx="2">
-            <a:schemeClr val="accent1">
-              <a:shade val="50000"/>
-            </a:schemeClr>
-          </a:lnRef>
-          <a:fillRef idx="1">
-            <a:schemeClr val="accent1"/>
-          </a:fillRef>
-          <a:effectRef idx="0">
-            <a:schemeClr val="accent1"/>
-          </a:effectRef>
-          <a:fontRef idx="minor">
-            <a:schemeClr val="lt1"/>
-          </a:fontRef>
-        </p:style>
-        <p:txBody>
-          <a:bodyPr rtlCol="0" anchor="ctr"/>
-          <a:lstStyle/>
-          <a:p>
-            <a:pPr algn="ctr"/>
-            <a:endParaRPr lang="en-GB" sz="1808">
-              <a:solidFill>
-                <a:srgbClr val="95BFE5"/>
-              </a:solidFill>
-            </a:endParaRPr>
-          </a:p>
-        </p:txBody>
-      </p:sp>
-      <p:sp>
-        <p:nvSpPr>
-          <p:cNvPr id="5" name="Rectangle: Rounded Corners 4">
-            <a:extLst>
-              <a:ext uri="{FF2B5EF4-FFF2-40B4-BE49-F238E27FC236}">
-                <a16:creationId xmlns:a16="http://schemas.microsoft.com/office/drawing/2014/main" id="{4035679B-9375-4A3B-9740-2D1E7E3D6445}"/>
-              </a:ext>
-            </a:extLst>
-          </p:cNvPr>
-          <p:cNvSpPr/>
-          <p:nvPr/>
-        </p:nvSpPr>
-        <p:spPr>
-          <a:xfrm>
-            <a:off x="0" y="2544866"/>
-            <a:ext cx="1138136" cy="1735034"/>
-          </a:xfrm>
-          <a:prstGeom prst="roundRect">
-            <a:avLst>
-              <a:gd name="adj" fmla="val 0"/>
-            </a:avLst>
-          </a:prstGeom>
-          <a:solidFill>
-            <a:srgbClr val="5AB1BB"/>
-          </a:solidFill>
-          <a:ln w="101600">
-            <a:noFill/>
-          </a:ln>
-        </p:spPr>
-        <p:style>
-          <a:lnRef idx="2">
-            <a:schemeClr val="accent1">
-              <a:shade val="50000"/>
-            </a:schemeClr>
-          </a:lnRef>
-          <a:fillRef idx="1">
-            <a:schemeClr val="accent1"/>
-          </a:fillRef>
-          <a:effectRef idx="0">
-            <a:schemeClr val="accent1"/>
-          </a:effectRef>
-          <a:fontRef idx="minor">
-            <a:schemeClr val="lt1"/>
-          </a:fontRef>
-        </p:style>
-        <p:txBody>
-          <a:bodyPr rtlCol="0" anchor="ctr"/>
-          <a:lstStyle/>
-          <a:p>
-            <a:pPr algn="ctr"/>
-            <a:endParaRPr lang="en-GB" sz="1808">
-              <a:solidFill>
-                <a:srgbClr val="95BFE5"/>
-              </a:solidFill>
-            </a:endParaRPr>
-          </a:p>
-        </p:txBody>
-      </p:sp>
-      <p:sp>
-        <p:nvSpPr>
-          <p:cNvPr id="3" name="TextBox 2">
-            <a:extLst>
-              <a:ext uri="{FF2B5EF4-FFF2-40B4-BE49-F238E27FC236}">
-                <a16:creationId xmlns:a16="http://schemas.microsoft.com/office/drawing/2014/main" id="{56BA9D04-7576-0017-8F07-92AFBC13D6A6}"/>
-              </a:ext>
-            </a:extLst>
-          </p:cNvPr>
-          <p:cNvSpPr txBox="1"/>
-          <p:nvPr/>
-        </p:nvSpPr>
-        <p:spPr>
-          <a:xfrm>
-            <a:off x="1155920" y="2351235"/>
-            <a:ext cx="4584078" cy="1200329"/>
-          </a:xfrm>
-          <a:prstGeom prst="rect">
-            <a:avLst/>
-          </a:prstGeom>
-          <a:noFill/>
-        </p:spPr>
-        <p:txBody>
-          <a:bodyPr wrap="square" rtlCol="0">
-            <a:spAutoFit/>
-          </a:bodyPr>
-          <a:lstStyle/>
-          <a:p>
-            <a:r>
-              <a:rPr lang="en-GB" sz="7200" b="1">
-                <a:solidFill>
-                  <a:schemeClr val="bg1"/>
-                </a:solidFill>
-                <a:latin typeface="Android Insomnia" pitchFamily="2" charset="-128"/>
-                <a:ea typeface="Android Insomnia" pitchFamily="2" charset="-128"/>
-                <a:cs typeface="Android Insomnia" pitchFamily="2" charset="-128"/>
-              </a:rPr>
-              <a:t>causeway</a:t>
-            </a:r>
-          </a:p>
-        </p:txBody>
-      </p:sp>
-      <p:sp>
-        <p:nvSpPr>
-          <p:cNvPr id="10" name="TextBox 9">
-            <a:extLst>
-              <a:ext uri="{FF2B5EF4-FFF2-40B4-BE49-F238E27FC236}">
-                <a16:creationId xmlns:a16="http://schemas.microsoft.com/office/drawing/2014/main" id="{C64F2FFB-CDB5-6BCD-6256-EE2A05FDCE17}"/>
-              </a:ext>
-            </a:extLst>
-          </p:cNvPr>
-          <p:cNvSpPr txBox="1"/>
-          <p:nvPr/>
-        </p:nvSpPr>
-        <p:spPr>
-          <a:xfrm>
-            <a:off x="-75188" y="1760070"/>
-            <a:ext cx="1336806" cy="830997"/>
-          </a:xfrm>
-          <a:prstGeom prst="rect">
-            <a:avLst/>
-          </a:prstGeom>
-          <a:noFill/>
-        </p:spPr>
-        <p:txBody>
-          <a:bodyPr wrap="square" rtlCol="0">
-            <a:spAutoFit/>
-          </a:bodyPr>
-          <a:lstStyle/>
-          <a:p>
-            <a:r>
-              <a:rPr lang="en-US" sz="4800" b="1">
-                <a:solidFill>
-                  <a:schemeClr val="bg1"/>
-                </a:solidFill>
-                <a:latin typeface="Android Insomnia" pitchFamily="2" charset="-128"/>
-                <a:ea typeface="Android Insomnia" pitchFamily="2" charset="-128"/>
-                <a:cs typeface="Android Insomnia" pitchFamily="2" charset="-128"/>
-              </a:rPr>
-              <a:t>asf</a:t>
-            </a:r>
-            <a:endParaRPr lang="en-GB" sz="4800" b="1">
-              <a:solidFill>
-                <a:schemeClr val="bg1"/>
-              </a:solidFill>
-              <a:latin typeface="Android Insomnia" pitchFamily="2" charset="-128"/>
-              <a:ea typeface="Android Insomnia" pitchFamily="2" charset="-128"/>
-              <a:cs typeface="Android Insomnia" pitchFamily="2" charset="-128"/>
-            </a:endParaRPr>
-          </a:p>
-        </p:txBody>
-      </p:sp>
-    </p:spTree>
-    <p:extLst>
-      <p:ext uri="{BB962C8B-B14F-4D97-AF65-F5344CB8AC3E}">
-        <p14:creationId xmlns:p14="http://schemas.microsoft.com/office/powerpoint/2010/main" val="494928356"/>
-      </p:ext>
-    </p:extLst>
-  </p:cSld>
-  <p:clrMapOvr>
-    <a:masterClrMapping/>
-  </p:clrMapOvr>
-</p:sld>
-</file>
-
-<file path=ppt/slides/slide5.xml><?xml version="1.0" encoding="utf-8"?>
-<p:sld xmlns:a="http://schemas.openxmlformats.org/drawingml/2006/main" xmlns:r="http://schemas.openxmlformats.org/officeDocument/2006/relationships" xmlns:p="http://schemas.openxmlformats.org/presentationml/2006/main">
-  <p:cSld>
-    <p:spTree>
-      <p:nvGrpSpPr>
-        <p:cNvPr id="1" name=""/>
-        <p:cNvGrpSpPr/>
-        <p:nvPr/>
-      </p:nvGrpSpPr>
-      <p:grpSpPr>
-        <a:xfrm>
-          <a:off x="0" y="0"/>
-          <a:ext cx="0" cy="0"/>
-          <a:chOff x="0" y="0"/>
-          <a:chExt cx="0" cy="0"/>
-        </a:xfrm>
-      </p:grpSpPr>
-      <p:sp>
-        <p:nvSpPr>
-          <p:cNvPr id="12" name="Rectangle: Rounded Corners 11">
-            <a:extLst>
-              <a:ext uri="{FF2B5EF4-FFF2-40B4-BE49-F238E27FC236}">
-                <a16:creationId xmlns:a16="http://schemas.microsoft.com/office/drawing/2014/main" id="{A31F33E6-48C6-2F14-D301-2E0B7985B91A}"/>
-              </a:ext>
-            </a:extLst>
-          </p:cNvPr>
-          <p:cNvSpPr/>
-          <p:nvPr/>
-        </p:nvSpPr>
-        <p:spPr>
-          <a:xfrm>
-            <a:off x="0" y="0"/>
-            <a:ext cx="1138136" cy="2509736"/>
-          </a:xfrm>
-          <a:prstGeom prst="roundRect">
-            <a:avLst>
-              <a:gd name="adj" fmla="val 0"/>
-            </a:avLst>
-          </a:prstGeom>
-          <a:solidFill>
-            <a:srgbClr val="EEB4B3"/>
-          </a:solidFill>
-          <a:ln w="101600">
-            <a:noFill/>
-          </a:ln>
-        </p:spPr>
-        <p:style>
-          <a:lnRef idx="2">
-            <a:schemeClr val="accent1">
-              <a:shade val="50000"/>
-            </a:schemeClr>
-          </a:lnRef>
-          <a:fillRef idx="1">
-            <a:schemeClr val="accent1"/>
-          </a:fillRef>
-          <a:effectRef idx="0">
-            <a:schemeClr val="accent1"/>
-          </a:effectRef>
-          <a:fontRef idx="minor">
-            <a:schemeClr val="lt1"/>
-          </a:fontRef>
-        </p:style>
-        <p:txBody>
-          <a:bodyPr rtlCol="0" anchor="ctr"/>
-          <a:lstStyle/>
-          <a:p>
-            <a:pPr algn="ctr"/>
-            <a:endParaRPr lang="en-GB" sz="1808">
-              <a:solidFill>
-                <a:srgbClr val="95BFE5"/>
-              </a:solidFill>
-            </a:endParaRPr>
-          </a:p>
-        </p:txBody>
-      </p:sp>
-      <p:sp>
-        <p:nvSpPr>
-          <p:cNvPr id="6" name="Rectangle: Rounded Corners 5">
-            <a:extLst>
-              <a:ext uri="{FF2B5EF4-FFF2-40B4-BE49-F238E27FC236}">
-                <a16:creationId xmlns:a16="http://schemas.microsoft.com/office/drawing/2014/main" id="{FEC4D2F5-1B5F-8B94-75B0-128AD20C2F6A}"/>
-              </a:ext>
-            </a:extLst>
-          </p:cNvPr>
-          <p:cNvSpPr/>
-          <p:nvPr/>
-        </p:nvSpPr>
-        <p:spPr>
-          <a:xfrm>
-            <a:off x="1175372" y="2544866"/>
-            <a:ext cx="4584078" cy="1750564"/>
-          </a:xfrm>
-          <a:prstGeom prst="roundRect">
-            <a:avLst>
-              <a:gd name="adj" fmla="val 0"/>
-            </a:avLst>
-          </a:prstGeom>
-          <a:solidFill>
-            <a:srgbClr val="7A263A"/>
-          </a:solidFill>
-          <a:ln w="101600">
-            <a:noFill/>
-          </a:ln>
-        </p:spPr>
-        <p:style>
-          <a:lnRef idx="2">
-            <a:schemeClr val="accent1">
-              <a:shade val="50000"/>
-            </a:schemeClr>
-          </a:lnRef>
-          <a:fillRef idx="1">
-            <a:schemeClr val="accent1"/>
-          </a:fillRef>
-          <a:effectRef idx="0">
-            <a:schemeClr val="accent1"/>
-          </a:effectRef>
-          <a:fontRef idx="minor">
-            <a:schemeClr val="lt1"/>
-          </a:fontRef>
-        </p:style>
-        <p:txBody>
-          <a:bodyPr rtlCol="0" anchor="ctr"/>
-          <a:lstStyle/>
-          <a:p>
-            <a:pPr algn="ctr"/>
-            <a:endParaRPr lang="en-GB" sz="1808">
-              <a:solidFill>
-                <a:srgbClr val="95BFE5"/>
-              </a:solidFill>
-            </a:endParaRPr>
-          </a:p>
-        </p:txBody>
-      </p:sp>
-      <p:sp>
-        <p:nvSpPr>
-          <p:cNvPr id="4" name="Rectangle: Rounded Corners 3">
-            <a:extLst>
-              <a:ext uri="{FF2B5EF4-FFF2-40B4-BE49-F238E27FC236}">
-                <a16:creationId xmlns:a16="http://schemas.microsoft.com/office/drawing/2014/main" id="{CAC95C35-1B48-AA1E-545D-C3E97BCC7321}"/>
-              </a:ext>
-            </a:extLst>
-          </p:cNvPr>
-          <p:cNvSpPr/>
-          <p:nvPr/>
-        </p:nvSpPr>
-        <p:spPr>
-          <a:xfrm>
-            <a:off x="1175372" y="-6979"/>
-            <a:ext cx="4584078" cy="2516715"/>
-          </a:xfrm>
-          <a:prstGeom prst="roundRect">
-            <a:avLst>
-              <a:gd name="adj" fmla="val 0"/>
-            </a:avLst>
-          </a:prstGeom>
-          <a:solidFill>
-            <a:srgbClr val="FEC601"/>
-          </a:solidFill>
-          <a:ln w="101600">
-            <a:noFill/>
-          </a:ln>
-        </p:spPr>
-        <p:style>
-          <a:lnRef idx="2">
-            <a:schemeClr val="accent1">
-              <a:shade val="50000"/>
-            </a:schemeClr>
-          </a:lnRef>
-          <a:fillRef idx="1">
-            <a:schemeClr val="accent1"/>
-          </a:fillRef>
-          <a:effectRef idx="0">
-            <a:schemeClr val="accent1"/>
-          </a:effectRef>
-          <a:fontRef idx="minor">
-            <a:schemeClr val="lt1"/>
-          </a:fontRef>
-        </p:style>
-        <p:txBody>
-          <a:bodyPr rtlCol="0" anchor="ctr"/>
-          <a:lstStyle/>
-          <a:p>
-            <a:pPr algn="ctr"/>
-            <a:endParaRPr lang="en-GB" sz="1808">
-              <a:solidFill>
-                <a:srgbClr val="95BFE5"/>
-              </a:solidFill>
-            </a:endParaRPr>
-          </a:p>
-        </p:txBody>
-      </p:sp>
-      <p:sp>
-        <p:nvSpPr>
-          <p:cNvPr id="5" name="Rectangle: Rounded Corners 4">
-            <a:extLst>
-              <a:ext uri="{FF2B5EF4-FFF2-40B4-BE49-F238E27FC236}">
-                <a16:creationId xmlns:a16="http://schemas.microsoft.com/office/drawing/2014/main" id="{4035679B-9375-4A3B-9740-2D1E7E3D6445}"/>
-              </a:ext>
-            </a:extLst>
-          </p:cNvPr>
-          <p:cNvSpPr/>
-          <p:nvPr/>
-        </p:nvSpPr>
-        <p:spPr>
-          <a:xfrm>
-            <a:off x="0" y="2544866"/>
-            <a:ext cx="1138136" cy="1750564"/>
-          </a:xfrm>
-          <a:prstGeom prst="roundRect">
-            <a:avLst>
-              <a:gd name="adj" fmla="val 0"/>
-            </a:avLst>
-          </a:prstGeom>
-          <a:solidFill>
-            <a:srgbClr val="2364AA"/>
-          </a:solidFill>
-          <a:ln w="101600">
-            <a:noFill/>
-          </a:ln>
-        </p:spPr>
-        <p:style>
-          <a:lnRef idx="2">
-            <a:schemeClr val="accent1">
-              <a:shade val="50000"/>
-            </a:schemeClr>
-          </a:lnRef>
-          <a:fillRef idx="1">
-            <a:schemeClr val="accent1"/>
-          </a:fillRef>
-          <a:effectRef idx="0">
-            <a:schemeClr val="accent1"/>
-          </a:effectRef>
-          <a:fontRef idx="minor">
-            <a:schemeClr val="lt1"/>
-          </a:fontRef>
-        </p:style>
-        <p:txBody>
-          <a:bodyPr rtlCol="0" anchor="ctr"/>
-          <a:lstStyle/>
-          <a:p>
-            <a:pPr algn="ctr"/>
-            <a:endParaRPr lang="en-GB" sz="1808">
-              <a:solidFill>
-                <a:srgbClr val="95BFE5"/>
-              </a:solidFill>
-            </a:endParaRPr>
-          </a:p>
-        </p:txBody>
-      </p:sp>
-      <p:sp>
-        <p:nvSpPr>
-          <p:cNvPr id="3" name="TextBox 2">
-            <a:extLst>
-              <a:ext uri="{FF2B5EF4-FFF2-40B4-BE49-F238E27FC236}">
-                <a16:creationId xmlns:a16="http://schemas.microsoft.com/office/drawing/2014/main" id="{56BA9D04-7576-0017-8F07-92AFBC13D6A6}"/>
-              </a:ext>
-            </a:extLst>
-          </p:cNvPr>
-          <p:cNvSpPr txBox="1"/>
-          <p:nvPr/>
-        </p:nvSpPr>
-        <p:spPr>
-          <a:xfrm>
-            <a:off x="1155920" y="2351235"/>
-            <a:ext cx="4584078" cy="1200329"/>
-          </a:xfrm>
-          <a:prstGeom prst="rect">
-            <a:avLst/>
-          </a:prstGeom>
-          <a:noFill/>
-        </p:spPr>
-        <p:txBody>
-          <a:bodyPr wrap="square" rtlCol="0">
-            <a:spAutoFit/>
-          </a:bodyPr>
-          <a:lstStyle/>
-          <a:p>
-            <a:r>
-              <a:rPr lang="en-GB" sz="7200" b="1">
-                <a:solidFill>
-                  <a:schemeClr val="bg1"/>
-                </a:solidFill>
-                <a:latin typeface="Android Insomnia" pitchFamily="2" charset="-128"/>
-                <a:ea typeface="Android Insomnia" pitchFamily="2" charset="-128"/>
-                <a:cs typeface="Android Insomnia" pitchFamily="2" charset="-128"/>
-              </a:rPr>
-              <a:t>causeway</a:t>
-            </a:r>
-          </a:p>
-        </p:txBody>
-      </p:sp>
-      <p:sp>
-        <p:nvSpPr>
-          <p:cNvPr id="10" name="TextBox 9">
-            <a:extLst>
-              <a:ext uri="{FF2B5EF4-FFF2-40B4-BE49-F238E27FC236}">
-                <a16:creationId xmlns:a16="http://schemas.microsoft.com/office/drawing/2014/main" id="{C64F2FFB-CDB5-6BCD-6256-EE2A05FDCE17}"/>
-              </a:ext>
-            </a:extLst>
-          </p:cNvPr>
-          <p:cNvSpPr txBox="1"/>
-          <p:nvPr/>
-        </p:nvSpPr>
-        <p:spPr>
-          <a:xfrm>
-            <a:off x="-75188" y="1760070"/>
-            <a:ext cx="1336806" cy="830997"/>
-          </a:xfrm>
-          <a:prstGeom prst="rect">
-            <a:avLst/>
-          </a:prstGeom>
-          <a:noFill/>
-        </p:spPr>
-        <p:txBody>
-          <a:bodyPr wrap="square" rtlCol="0">
-            <a:spAutoFit/>
-          </a:bodyPr>
-          <a:lstStyle/>
-          <a:p>
-            <a:r>
-              <a:rPr lang="en-US" sz="4800" b="1">
-                <a:solidFill>
-                  <a:schemeClr val="bg1"/>
-                </a:solidFill>
-                <a:latin typeface="Android Insomnia" pitchFamily="2" charset="-128"/>
-                <a:ea typeface="Android Insomnia" pitchFamily="2" charset="-128"/>
-                <a:cs typeface="Android Insomnia" pitchFamily="2" charset="-128"/>
-              </a:rPr>
-              <a:t>asf</a:t>
-            </a:r>
-            <a:endParaRPr lang="en-GB" sz="4800" b="1">
-              <a:solidFill>
-                <a:schemeClr val="bg1"/>
-              </a:solidFill>
-              <a:latin typeface="Android Insomnia" pitchFamily="2" charset="-128"/>
-              <a:ea typeface="Android Insomnia" pitchFamily="2" charset="-128"/>
-              <a:cs typeface="Android Insomnia" pitchFamily="2" charset="-128"/>
-            </a:endParaRPr>
-          </a:p>
-        </p:txBody>
-      </p:sp>
-    </p:spTree>
-    <p:extLst>
-      <p:ext uri="{BB962C8B-B14F-4D97-AF65-F5344CB8AC3E}">
-        <p14:creationId xmlns:p14="http://schemas.microsoft.com/office/powerpoint/2010/main" val="2424248051"/>
-      </p:ext>
-    </p:extLst>
-  </p:cSld>
-  <p:clrMapOvr>
-    <a:masterClrMapping/>
-  </p:clrMapOvr>
-</p:sld>
-</file>
-
-<file path=ppt/slides/slide6.xml><?xml version="1.0" encoding="utf-8"?>
-<p:sld xmlns:a="http://schemas.openxmlformats.org/drawingml/2006/main" xmlns:r="http://schemas.openxmlformats.org/officeDocument/2006/relationships" xmlns:p="http://schemas.openxmlformats.org/presentationml/2006/main">
-  <p:cSld>
-    <p:spTree>
-      <p:nvGrpSpPr>
-        <p:cNvPr id="1" name=""/>
-        <p:cNvGrpSpPr/>
-        <p:nvPr/>
-      </p:nvGrpSpPr>
-      <p:grpSpPr>
-        <a:xfrm>
-          <a:off x="0" y="0"/>
-          <a:ext cx="0" cy="0"/>
-          <a:chOff x="0" y="0"/>
-          <a:chExt cx="0" cy="0"/>
-        </a:xfrm>
-      </p:grpSpPr>
-      <p:sp>
-        <p:nvSpPr>
-          <p:cNvPr id="12" name="Rectangle: Rounded Corners 11">
-            <a:extLst>
-              <a:ext uri="{FF2B5EF4-FFF2-40B4-BE49-F238E27FC236}">
-                <a16:creationId xmlns:a16="http://schemas.microsoft.com/office/drawing/2014/main" id="{A31F33E6-48C6-2F14-D301-2E0B7985B91A}"/>
-              </a:ext>
-            </a:extLst>
-          </p:cNvPr>
-          <p:cNvSpPr/>
-          <p:nvPr/>
-        </p:nvSpPr>
-        <p:spPr>
-          <a:xfrm>
-            <a:off x="0" y="0"/>
-            <a:ext cx="1138136" cy="2509736"/>
-          </a:xfrm>
-          <a:prstGeom prst="roundRect">
-            <a:avLst>
-              <a:gd name="adj" fmla="val 0"/>
-            </a:avLst>
-          </a:prstGeom>
-          <a:solidFill>
-            <a:srgbClr val="5AB1BB"/>
-          </a:solidFill>
-          <a:ln w="101600">
-            <a:noFill/>
-          </a:ln>
-        </p:spPr>
-        <p:style>
-          <a:lnRef idx="2">
-            <a:schemeClr val="accent1">
-              <a:shade val="50000"/>
-            </a:schemeClr>
-          </a:lnRef>
-          <a:fillRef idx="1">
-            <a:schemeClr val="accent1"/>
-          </a:fillRef>
-          <a:effectRef idx="0">
-            <a:schemeClr val="accent1"/>
-          </a:effectRef>
-          <a:fontRef idx="minor">
-            <a:schemeClr val="lt1"/>
-          </a:fontRef>
-        </p:style>
-        <p:txBody>
-          <a:bodyPr rtlCol="0" anchor="ctr"/>
-          <a:lstStyle/>
-          <a:p>
-            <a:pPr algn="ctr"/>
-            <a:endParaRPr lang="en-GB" sz="1808">
-              <a:solidFill>
-                <a:srgbClr val="95BFE5"/>
-              </a:solidFill>
-            </a:endParaRPr>
-          </a:p>
-        </p:txBody>
-      </p:sp>
-      <p:sp>
-        <p:nvSpPr>
-          <p:cNvPr id="6" name="Rectangle: Rounded Corners 5">
-            <a:extLst>
-              <a:ext uri="{FF2B5EF4-FFF2-40B4-BE49-F238E27FC236}">
-                <a16:creationId xmlns:a16="http://schemas.microsoft.com/office/drawing/2014/main" id="{FEC4D2F5-1B5F-8B94-75B0-128AD20C2F6A}"/>
-              </a:ext>
-            </a:extLst>
-          </p:cNvPr>
-          <p:cNvSpPr/>
-          <p:nvPr/>
-        </p:nvSpPr>
-        <p:spPr>
-          <a:xfrm>
-            <a:off x="1175372" y="2544866"/>
-            <a:ext cx="4584078" cy="1750564"/>
-          </a:xfrm>
-          <a:prstGeom prst="roundRect">
-            <a:avLst>
-              <a:gd name="adj" fmla="val 0"/>
-            </a:avLst>
-          </a:prstGeom>
-          <a:solidFill>
-            <a:srgbClr val="7A263A"/>
-          </a:solidFill>
-          <a:ln w="101600">
-            <a:noFill/>
-          </a:ln>
-        </p:spPr>
-        <p:style>
-          <a:lnRef idx="2">
-            <a:schemeClr val="accent1">
-              <a:shade val="50000"/>
-            </a:schemeClr>
-          </a:lnRef>
-          <a:fillRef idx="1">
-            <a:schemeClr val="accent1"/>
-          </a:fillRef>
-          <a:effectRef idx="0">
-            <a:schemeClr val="accent1"/>
-          </a:effectRef>
-          <a:fontRef idx="minor">
-            <a:schemeClr val="lt1"/>
-          </a:fontRef>
-        </p:style>
-        <p:txBody>
-          <a:bodyPr rtlCol="0" anchor="ctr"/>
-          <a:lstStyle/>
-          <a:p>
-            <a:pPr algn="ctr"/>
-            <a:endParaRPr lang="en-GB" sz="1808">
-              <a:solidFill>
-                <a:srgbClr val="95BFE5"/>
-              </a:solidFill>
-            </a:endParaRPr>
-          </a:p>
-        </p:txBody>
-      </p:sp>
-      <p:sp>
-        <p:nvSpPr>
-          <p:cNvPr id="4" name="Rectangle: Rounded Corners 3">
-            <a:extLst>
-              <a:ext uri="{FF2B5EF4-FFF2-40B4-BE49-F238E27FC236}">
-                <a16:creationId xmlns:a16="http://schemas.microsoft.com/office/drawing/2014/main" id="{CAC95C35-1B48-AA1E-545D-C3E97BCC7321}"/>
-              </a:ext>
-            </a:extLst>
-          </p:cNvPr>
-          <p:cNvSpPr/>
-          <p:nvPr/>
-        </p:nvSpPr>
-        <p:spPr>
-          <a:xfrm>
-            <a:off x="1175372" y="-6979"/>
-            <a:ext cx="4584078" cy="2516715"/>
-          </a:xfrm>
-          <a:prstGeom prst="roundRect">
-            <a:avLst>
-              <a:gd name="adj" fmla="val 0"/>
-            </a:avLst>
-          </a:prstGeom>
-          <a:solidFill>
-            <a:srgbClr val="FEC601"/>
-          </a:solidFill>
-          <a:ln w="101600">
-            <a:noFill/>
-          </a:ln>
-        </p:spPr>
-        <p:style>
-          <a:lnRef idx="2">
-            <a:schemeClr val="accent1">
-              <a:shade val="50000"/>
-            </a:schemeClr>
-          </a:lnRef>
-          <a:fillRef idx="1">
-            <a:schemeClr val="accent1"/>
-          </a:fillRef>
-          <a:effectRef idx="0">
-            <a:schemeClr val="accent1"/>
-          </a:effectRef>
-          <a:fontRef idx="minor">
-            <a:schemeClr val="lt1"/>
-          </a:fontRef>
-        </p:style>
-        <p:txBody>
-          <a:bodyPr rtlCol="0" anchor="ctr"/>
-          <a:lstStyle/>
-          <a:p>
-            <a:pPr algn="ctr"/>
-            <a:endParaRPr lang="en-GB" sz="1808">
-              <a:solidFill>
-                <a:srgbClr val="95BFE5"/>
-              </a:solidFill>
-            </a:endParaRPr>
-          </a:p>
-        </p:txBody>
-      </p:sp>
-      <p:sp>
-        <p:nvSpPr>
-          <p:cNvPr id="5" name="Rectangle: Rounded Corners 4">
-            <a:extLst>
-              <a:ext uri="{FF2B5EF4-FFF2-40B4-BE49-F238E27FC236}">
-                <a16:creationId xmlns:a16="http://schemas.microsoft.com/office/drawing/2014/main" id="{4035679B-9375-4A3B-9740-2D1E7E3D6445}"/>
-              </a:ext>
-            </a:extLst>
-          </p:cNvPr>
-          <p:cNvSpPr/>
-          <p:nvPr/>
-        </p:nvSpPr>
-        <p:spPr>
-          <a:xfrm>
-            <a:off x="0" y="2544866"/>
-            <a:ext cx="1138136" cy="1750564"/>
-          </a:xfrm>
-          <a:prstGeom prst="roundRect">
-            <a:avLst>
-              <a:gd name="adj" fmla="val 0"/>
-            </a:avLst>
-          </a:prstGeom>
-          <a:solidFill>
-            <a:srgbClr val="2364AA"/>
-          </a:solidFill>
-          <a:ln w="101600">
-            <a:noFill/>
-          </a:ln>
-        </p:spPr>
-        <p:style>
-          <a:lnRef idx="2">
-            <a:schemeClr val="accent1">
-              <a:shade val="50000"/>
-            </a:schemeClr>
-          </a:lnRef>
-          <a:fillRef idx="1">
-            <a:schemeClr val="accent1"/>
-          </a:fillRef>
-          <a:effectRef idx="0">
-            <a:schemeClr val="accent1"/>
-          </a:effectRef>
-          <a:fontRef idx="minor">
-            <a:schemeClr val="lt1"/>
-          </a:fontRef>
-        </p:style>
-        <p:txBody>
-          <a:bodyPr rtlCol="0" anchor="ctr"/>
-          <a:lstStyle/>
-          <a:p>
-            <a:pPr algn="ctr"/>
-            <a:endParaRPr lang="en-GB" sz="1808">
-              <a:solidFill>
-                <a:srgbClr val="95BFE5"/>
-              </a:solidFill>
-            </a:endParaRPr>
-          </a:p>
-        </p:txBody>
-      </p:sp>
-      <p:sp>
-        <p:nvSpPr>
-          <p:cNvPr id="3" name="TextBox 2">
-            <a:extLst>
-              <a:ext uri="{FF2B5EF4-FFF2-40B4-BE49-F238E27FC236}">
-                <a16:creationId xmlns:a16="http://schemas.microsoft.com/office/drawing/2014/main" id="{56BA9D04-7576-0017-8F07-92AFBC13D6A6}"/>
-              </a:ext>
-            </a:extLst>
-          </p:cNvPr>
-          <p:cNvSpPr txBox="1"/>
-          <p:nvPr/>
-        </p:nvSpPr>
-        <p:spPr>
-          <a:xfrm>
-            <a:off x="1155920" y="2351235"/>
-            <a:ext cx="4584078" cy="1200329"/>
-          </a:xfrm>
-          <a:prstGeom prst="rect">
-            <a:avLst/>
-          </a:prstGeom>
-          <a:noFill/>
-        </p:spPr>
-        <p:txBody>
-          <a:bodyPr wrap="square" rtlCol="0">
-            <a:spAutoFit/>
-          </a:bodyPr>
-          <a:lstStyle/>
-          <a:p>
-            <a:r>
-              <a:rPr lang="en-GB" sz="7200" b="1">
-                <a:solidFill>
-                  <a:schemeClr val="bg1"/>
-                </a:solidFill>
-                <a:latin typeface="Android Insomnia" pitchFamily="2" charset="-128"/>
-                <a:ea typeface="Android Insomnia" pitchFamily="2" charset="-128"/>
-                <a:cs typeface="Android Insomnia" pitchFamily="2" charset="-128"/>
-              </a:rPr>
-              <a:t>causeway</a:t>
-            </a:r>
-          </a:p>
-        </p:txBody>
-      </p:sp>
-      <p:sp>
-        <p:nvSpPr>
-          <p:cNvPr id="10" name="TextBox 9">
-            <a:extLst>
-              <a:ext uri="{FF2B5EF4-FFF2-40B4-BE49-F238E27FC236}">
-                <a16:creationId xmlns:a16="http://schemas.microsoft.com/office/drawing/2014/main" id="{C64F2FFB-CDB5-6BCD-6256-EE2A05FDCE17}"/>
-              </a:ext>
-            </a:extLst>
-          </p:cNvPr>
-          <p:cNvSpPr txBox="1"/>
-          <p:nvPr/>
-        </p:nvSpPr>
-        <p:spPr>
-          <a:xfrm>
-            <a:off x="-75188" y="1760070"/>
-            <a:ext cx="1336806" cy="830997"/>
-          </a:xfrm>
-          <a:prstGeom prst="rect">
-            <a:avLst/>
-          </a:prstGeom>
-          <a:noFill/>
-        </p:spPr>
-        <p:txBody>
-          <a:bodyPr wrap="square" rtlCol="0">
-            <a:spAutoFit/>
-          </a:bodyPr>
-          <a:lstStyle/>
-          <a:p>
-            <a:r>
-              <a:rPr lang="en-US" sz="4800" b="1">
-                <a:solidFill>
-                  <a:schemeClr val="bg1"/>
-                </a:solidFill>
-                <a:latin typeface="Android Insomnia" pitchFamily="2" charset="-128"/>
-                <a:ea typeface="Android Insomnia" pitchFamily="2" charset="-128"/>
-                <a:cs typeface="Android Insomnia" pitchFamily="2" charset="-128"/>
-              </a:rPr>
-              <a:t>asf</a:t>
-            </a:r>
-            <a:endParaRPr lang="en-GB" sz="4800" b="1">
-              <a:solidFill>
-                <a:schemeClr val="bg1"/>
-              </a:solidFill>
-              <a:latin typeface="Android Insomnia" pitchFamily="2" charset="-128"/>
-              <a:ea typeface="Android Insomnia" pitchFamily="2" charset="-128"/>
-              <a:cs typeface="Android Insomnia" pitchFamily="2" charset="-128"/>
-            </a:endParaRPr>
-          </a:p>
-        </p:txBody>
-      </p:sp>
-    </p:spTree>
-    <p:extLst>
-      <p:ext uri="{BB962C8B-B14F-4D97-AF65-F5344CB8AC3E}">
-        <p14:creationId xmlns:p14="http://schemas.microsoft.com/office/powerpoint/2010/main" val="1760134204"/>
-      </p:ext>
-    </p:extLst>
-  </p:cSld>
-  <p:clrMapOvr>
-    <a:masterClrMapping/>
-  </p:clrMapOvr>
-</p:sld>
-</file>
-
-<file path=ppt/slides/slide7.xml><?xml version="1.0" encoding="utf-8"?>
-<p:sld xmlns:a="http://schemas.openxmlformats.org/drawingml/2006/main" xmlns:r="http://schemas.openxmlformats.org/officeDocument/2006/relationships" xmlns:p="http://schemas.openxmlformats.org/presentationml/2006/main">
-  <p:cSld>
-    <p:spTree>
-      <p:nvGrpSpPr>
-        <p:cNvPr id="1" name=""/>
-        <p:cNvGrpSpPr/>
-        <p:nvPr/>
-      </p:nvGrpSpPr>
-      <p:grpSpPr>
-        <a:xfrm>
-          <a:off x="0" y="0"/>
-          <a:ext cx="0" cy="0"/>
-          <a:chOff x="0" y="0"/>
-          <a:chExt cx="0" cy="0"/>
-        </a:xfrm>
-      </p:grpSpPr>
-      <p:sp>
-        <p:nvSpPr>
-          <p:cNvPr id="12" name="Rectangle: Rounded Corners 11">
-            <a:extLst>
-              <a:ext uri="{FF2B5EF4-FFF2-40B4-BE49-F238E27FC236}">
-                <a16:creationId xmlns:a16="http://schemas.microsoft.com/office/drawing/2014/main" id="{A31F33E6-48C6-2F14-D301-2E0B7985B91A}"/>
-              </a:ext>
-            </a:extLst>
-          </p:cNvPr>
-          <p:cNvSpPr/>
-          <p:nvPr/>
-        </p:nvSpPr>
-        <p:spPr>
-          <a:xfrm>
-            <a:off x="0" y="0"/>
-            <a:ext cx="695529" cy="2006503"/>
-          </a:xfrm>
-          <a:prstGeom prst="roundRect">
-            <a:avLst>
-              <a:gd name="adj" fmla="val 10358"/>
-            </a:avLst>
-          </a:prstGeom>
-          <a:solidFill>
-            <a:srgbClr val="5AB1BB"/>
-          </a:solidFill>
-          <a:ln w="101600">
-            <a:noFill/>
-          </a:ln>
-        </p:spPr>
-        <p:style>
-          <a:lnRef idx="2">
-            <a:schemeClr val="accent1">
-              <a:shade val="50000"/>
-            </a:schemeClr>
-          </a:lnRef>
-          <a:fillRef idx="1">
-            <a:schemeClr val="accent1"/>
-          </a:fillRef>
-          <a:effectRef idx="0">
-            <a:schemeClr val="accent1"/>
-          </a:effectRef>
-          <a:fontRef idx="minor">
-            <a:schemeClr val="lt1"/>
-          </a:fontRef>
-        </p:style>
-        <p:txBody>
-          <a:bodyPr rtlCol="0" anchor="ctr"/>
-          <a:lstStyle/>
-          <a:p>
-            <a:pPr algn="ctr"/>
-            <a:endParaRPr lang="en-GB" sz="1808">
-              <a:solidFill>
-                <a:srgbClr val="95BFE5"/>
-              </a:solidFill>
-            </a:endParaRPr>
-          </a:p>
-        </p:txBody>
-      </p:sp>
-      <p:sp>
-        <p:nvSpPr>
-          <p:cNvPr id="6" name="Rectangle: Rounded Corners 5">
-            <a:extLst>
-              <a:ext uri="{FF2B5EF4-FFF2-40B4-BE49-F238E27FC236}">
-                <a16:creationId xmlns:a16="http://schemas.microsoft.com/office/drawing/2014/main" id="{FEC4D2F5-1B5F-8B94-75B0-128AD20C2F6A}"/>
-              </a:ext>
-            </a:extLst>
-          </p:cNvPr>
-          <p:cNvSpPr/>
-          <p:nvPr/>
-        </p:nvSpPr>
-        <p:spPr>
-          <a:xfrm>
-            <a:off x="1383957" y="2967174"/>
-            <a:ext cx="4375493" cy="1328256"/>
+            <a:off x="2132435" y="2965606"/>
+            <a:ext cx="3629259" cy="1328256"/>
           </a:xfrm>
           <a:prstGeom prst="roundRect">
             <a:avLst>
@@ -8060,12 +6292,12 @@
         </p:nvSpPr>
         <p:spPr>
           <a:xfrm>
-            <a:off x="1386190" y="-6979"/>
-            <a:ext cx="4375493" cy="2015741"/>
+            <a:off x="2132436" y="-6979"/>
+            <a:ext cx="3629247" cy="2015741"/>
           </a:xfrm>
           <a:prstGeom prst="roundRect">
             <a:avLst>
-              <a:gd name="adj" fmla="val 3933"/>
+              <a:gd name="adj" fmla="val 7552"/>
             </a:avLst>
           </a:prstGeom>
           <a:solidFill>
@@ -8118,8 +6350,8 @@
         </p:nvSpPr>
         <p:spPr>
           <a:xfrm>
-            <a:off x="-3561" y="2958624"/>
-            <a:ext cx="699090" cy="1336806"/>
+            <a:off x="-3562" y="2958625"/>
+            <a:ext cx="1396102" cy="1336806"/>
           </a:xfrm>
           <a:prstGeom prst="roundRect">
             <a:avLst>
@@ -8340,8 +6572,354 @@
           <p:nvPr/>
         </p:nvSpPr>
         <p:spPr>
-          <a:xfrm rot="16200000">
-            <a:off x="-289194" y="904038"/>
+          <a:xfrm>
+            <a:off x="-3562" y="1189178"/>
+            <a:ext cx="1536070" cy="923330"/>
+          </a:xfrm>
+          <a:prstGeom prst="rect">
+            <a:avLst/>
+          </a:prstGeom>
+          <a:noFill/>
+        </p:spPr>
+        <p:txBody>
+          <a:bodyPr wrap="square" rtlCol="0">
+            <a:spAutoFit/>
+          </a:bodyPr>
+          <a:lstStyle/>
+          <a:p>
+            <a:r>
+              <a:rPr lang="en-GB" sz="5400" b="1">
+                <a:solidFill>
+                  <a:schemeClr val="bg1"/>
+                </a:solidFill>
+                <a:latin typeface="Android Insomnia" pitchFamily="2" charset="-128"/>
+                <a:ea typeface="Android Insomnia" pitchFamily="2" charset="-128"/>
+                <a:cs typeface="Android Insomnia" pitchFamily="2" charset="-128"/>
+              </a:rPr>
+              <a:t>ASF</a:t>
+            </a:r>
+          </a:p>
+        </p:txBody>
+      </p:sp>
+    </p:spTree>
+    <p:extLst>
+      <p:ext uri="{BB962C8B-B14F-4D97-AF65-F5344CB8AC3E}">
+        <p14:creationId xmlns:p14="http://schemas.microsoft.com/office/powerpoint/2010/main" val="1690582736"/>
+      </p:ext>
+    </p:extLst>
+  </p:cSld>
+  <p:clrMapOvr>
+    <a:masterClrMapping/>
+  </p:clrMapOvr>
+</p:sld>
+</file>
+
+<file path=ppt/slides/slide2.xml><?xml version="1.0" encoding="utf-8"?>
+<p:sld xmlns:a="http://schemas.openxmlformats.org/drawingml/2006/main" xmlns:r="http://schemas.openxmlformats.org/officeDocument/2006/relationships" xmlns:p="http://schemas.openxmlformats.org/presentationml/2006/main">
+  <p:cSld>
+    <p:spTree>
+      <p:nvGrpSpPr>
+        <p:cNvPr id="1" name=""/>
+        <p:cNvGrpSpPr/>
+        <p:nvPr/>
+      </p:nvGrpSpPr>
+      <p:grpSpPr>
+        <a:xfrm>
+          <a:off x="0" y="0"/>
+          <a:ext cx="0" cy="0"/>
+          <a:chOff x="0" y="0"/>
+          <a:chExt cx="0" cy="0"/>
+        </a:xfrm>
+      </p:grpSpPr>
+      <p:sp>
+        <p:nvSpPr>
+          <p:cNvPr id="12" name="Rectangle: Rounded Corners 11">
+            <a:extLst>
+              <a:ext uri="{FF2B5EF4-FFF2-40B4-BE49-F238E27FC236}">
+                <a16:creationId xmlns:a16="http://schemas.microsoft.com/office/drawing/2014/main" id="{A31F33E6-48C6-2F14-D301-2E0B7985B91A}"/>
+              </a:ext>
+            </a:extLst>
+          </p:cNvPr>
+          <p:cNvSpPr/>
+          <p:nvPr/>
+        </p:nvSpPr>
+        <p:spPr>
+          <a:xfrm>
+            <a:off x="0" y="-6980"/>
+            <a:ext cx="1138136" cy="2509736"/>
+          </a:xfrm>
+          <a:prstGeom prst="roundRect">
+            <a:avLst>
+              <a:gd name="adj" fmla="val 0"/>
+            </a:avLst>
+          </a:prstGeom>
+          <a:solidFill>
+            <a:srgbClr val="EEB4B3"/>
+          </a:solidFill>
+          <a:ln w="101600">
+            <a:noFill/>
+          </a:ln>
+        </p:spPr>
+        <p:style>
+          <a:lnRef idx="2">
+            <a:schemeClr val="accent1">
+              <a:shade val="50000"/>
+            </a:schemeClr>
+          </a:lnRef>
+          <a:fillRef idx="1">
+            <a:schemeClr val="accent1"/>
+          </a:fillRef>
+          <a:effectRef idx="0">
+            <a:schemeClr val="accent1"/>
+          </a:effectRef>
+          <a:fontRef idx="minor">
+            <a:schemeClr val="lt1"/>
+          </a:fontRef>
+        </p:style>
+        <p:txBody>
+          <a:bodyPr rtlCol="0" anchor="ctr"/>
+          <a:lstStyle/>
+          <a:p>
+            <a:pPr algn="ctr"/>
+            <a:endParaRPr lang="en-GB" sz="1808">
+              <a:solidFill>
+                <a:srgbClr val="95BFE5"/>
+              </a:solidFill>
+            </a:endParaRPr>
+          </a:p>
+        </p:txBody>
+      </p:sp>
+      <p:sp>
+        <p:nvSpPr>
+          <p:cNvPr id="6" name="Rectangle: Rounded Corners 5">
+            <a:extLst>
+              <a:ext uri="{FF2B5EF4-FFF2-40B4-BE49-F238E27FC236}">
+                <a16:creationId xmlns:a16="http://schemas.microsoft.com/office/drawing/2014/main" id="{FEC4D2F5-1B5F-8B94-75B0-128AD20C2F6A}"/>
+              </a:ext>
+            </a:extLst>
+          </p:cNvPr>
+          <p:cNvSpPr/>
+          <p:nvPr/>
+        </p:nvSpPr>
+        <p:spPr>
+          <a:xfrm>
+            <a:off x="1175372" y="2544866"/>
+            <a:ext cx="4584078" cy="1735034"/>
+          </a:xfrm>
+          <a:prstGeom prst="roundRect">
+            <a:avLst>
+              <a:gd name="adj" fmla="val 0"/>
+            </a:avLst>
+          </a:prstGeom>
+          <a:solidFill>
+            <a:srgbClr val="7A263A"/>
+          </a:solidFill>
+          <a:ln w="101600">
+            <a:noFill/>
+          </a:ln>
+        </p:spPr>
+        <p:style>
+          <a:lnRef idx="2">
+            <a:schemeClr val="accent1">
+              <a:shade val="50000"/>
+            </a:schemeClr>
+          </a:lnRef>
+          <a:fillRef idx="1">
+            <a:schemeClr val="accent1"/>
+          </a:fillRef>
+          <a:effectRef idx="0">
+            <a:schemeClr val="accent1"/>
+          </a:effectRef>
+          <a:fontRef idx="minor">
+            <a:schemeClr val="lt1"/>
+          </a:fontRef>
+        </p:style>
+        <p:txBody>
+          <a:bodyPr rtlCol="0" anchor="ctr"/>
+          <a:lstStyle/>
+          <a:p>
+            <a:pPr algn="ctr"/>
+            <a:endParaRPr lang="en-GB" sz="1808">
+              <a:solidFill>
+                <a:srgbClr val="95BFE5"/>
+              </a:solidFill>
+            </a:endParaRPr>
+          </a:p>
+        </p:txBody>
+      </p:sp>
+      <p:sp>
+        <p:nvSpPr>
+          <p:cNvPr id="4" name="Rectangle: Rounded Corners 3">
+            <a:extLst>
+              <a:ext uri="{FF2B5EF4-FFF2-40B4-BE49-F238E27FC236}">
+                <a16:creationId xmlns:a16="http://schemas.microsoft.com/office/drawing/2014/main" id="{CAC95C35-1B48-AA1E-545D-C3E97BCC7321}"/>
+              </a:ext>
+            </a:extLst>
+          </p:cNvPr>
+          <p:cNvSpPr/>
+          <p:nvPr/>
+        </p:nvSpPr>
+        <p:spPr>
+          <a:xfrm>
+            <a:off x="1175372" y="0"/>
+            <a:ext cx="4584078" cy="2502756"/>
+          </a:xfrm>
+          <a:prstGeom prst="roundRect">
+            <a:avLst>
+              <a:gd name="adj" fmla="val 0"/>
+            </a:avLst>
+          </a:prstGeom>
+          <a:solidFill>
+            <a:srgbClr val="FEC601"/>
+          </a:solidFill>
+          <a:ln w="101600">
+            <a:noFill/>
+          </a:ln>
+        </p:spPr>
+        <p:style>
+          <a:lnRef idx="2">
+            <a:schemeClr val="accent1">
+              <a:shade val="50000"/>
+            </a:schemeClr>
+          </a:lnRef>
+          <a:fillRef idx="1">
+            <a:schemeClr val="accent1"/>
+          </a:fillRef>
+          <a:effectRef idx="0">
+            <a:schemeClr val="accent1"/>
+          </a:effectRef>
+          <a:fontRef idx="minor">
+            <a:schemeClr val="lt1"/>
+          </a:fontRef>
+        </p:style>
+        <p:txBody>
+          <a:bodyPr rtlCol="0" anchor="ctr"/>
+          <a:lstStyle/>
+          <a:p>
+            <a:pPr algn="ctr"/>
+            <a:endParaRPr lang="en-GB" sz="1808">
+              <a:solidFill>
+                <a:srgbClr val="95BFE5"/>
+              </a:solidFill>
+            </a:endParaRPr>
+          </a:p>
+        </p:txBody>
+      </p:sp>
+      <p:sp>
+        <p:nvSpPr>
+          <p:cNvPr id="5" name="Rectangle: Rounded Corners 4">
+            <a:extLst>
+              <a:ext uri="{FF2B5EF4-FFF2-40B4-BE49-F238E27FC236}">
+                <a16:creationId xmlns:a16="http://schemas.microsoft.com/office/drawing/2014/main" id="{4035679B-9375-4A3B-9740-2D1E7E3D6445}"/>
+              </a:ext>
+            </a:extLst>
+          </p:cNvPr>
+          <p:cNvSpPr/>
+          <p:nvPr/>
+        </p:nvSpPr>
+        <p:spPr>
+          <a:xfrm>
+            <a:off x="0" y="2544866"/>
+            <a:ext cx="1138136" cy="1735034"/>
+          </a:xfrm>
+          <a:prstGeom prst="roundRect">
+            <a:avLst>
+              <a:gd name="adj" fmla="val 0"/>
+            </a:avLst>
+          </a:prstGeom>
+          <a:solidFill>
+            <a:srgbClr val="5AB1BB"/>
+          </a:solidFill>
+          <a:ln w="101600">
+            <a:noFill/>
+          </a:ln>
+        </p:spPr>
+        <p:style>
+          <a:lnRef idx="2">
+            <a:schemeClr val="accent1">
+              <a:shade val="50000"/>
+            </a:schemeClr>
+          </a:lnRef>
+          <a:fillRef idx="1">
+            <a:schemeClr val="accent1"/>
+          </a:fillRef>
+          <a:effectRef idx="0">
+            <a:schemeClr val="accent1"/>
+          </a:effectRef>
+          <a:fontRef idx="minor">
+            <a:schemeClr val="lt1"/>
+          </a:fontRef>
+        </p:style>
+        <p:txBody>
+          <a:bodyPr rtlCol="0" anchor="ctr"/>
+          <a:lstStyle/>
+          <a:p>
+            <a:pPr algn="ctr"/>
+            <a:endParaRPr lang="en-GB" sz="1808">
+              <a:solidFill>
+                <a:srgbClr val="95BFE5"/>
+              </a:solidFill>
+            </a:endParaRPr>
+          </a:p>
+        </p:txBody>
+      </p:sp>
+      <p:sp>
+        <p:nvSpPr>
+          <p:cNvPr id="3" name="TextBox 2">
+            <a:extLst>
+              <a:ext uri="{FF2B5EF4-FFF2-40B4-BE49-F238E27FC236}">
+                <a16:creationId xmlns:a16="http://schemas.microsoft.com/office/drawing/2014/main" id="{56BA9D04-7576-0017-8F07-92AFBC13D6A6}"/>
+              </a:ext>
+            </a:extLst>
+          </p:cNvPr>
+          <p:cNvSpPr txBox="1"/>
+          <p:nvPr/>
+        </p:nvSpPr>
+        <p:spPr>
+          <a:xfrm>
+            <a:off x="1162900" y="2351235"/>
+            <a:ext cx="4584078" cy="1200329"/>
+          </a:xfrm>
+          <a:prstGeom prst="rect">
+            <a:avLst/>
+          </a:prstGeom>
+          <a:noFill/>
+        </p:spPr>
+        <p:txBody>
+          <a:bodyPr wrap="square" rtlCol="0">
+            <a:spAutoFit/>
+          </a:bodyPr>
+          <a:lstStyle/>
+          <a:p>
+            <a:r>
+              <a:rPr lang="en-GB" sz="7200" b="1">
+                <a:solidFill>
+                  <a:schemeClr val="bg1"/>
+                </a:solidFill>
+                <a:latin typeface="Android Insomnia" pitchFamily="2" charset="-128"/>
+                <a:ea typeface="Android Insomnia" pitchFamily="2" charset="-128"/>
+                <a:cs typeface="Android Insomnia" pitchFamily="2" charset="-128"/>
+              </a:rPr>
+              <a:t>causeway</a:t>
+            </a:r>
+          </a:p>
+        </p:txBody>
+      </p:sp>
+      <p:sp>
+        <p:nvSpPr>
+          <p:cNvPr id="10" name="TextBox 9">
+            <a:extLst>
+              <a:ext uri="{FF2B5EF4-FFF2-40B4-BE49-F238E27FC236}">
+                <a16:creationId xmlns:a16="http://schemas.microsoft.com/office/drawing/2014/main" id="{C64F2FFB-CDB5-6BCD-6256-EE2A05FDCE17}"/>
+              </a:ext>
+            </a:extLst>
+          </p:cNvPr>
+          <p:cNvSpPr txBox="1"/>
+          <p:nvPr/>
+        </p:nvSpPr>
+        <p:spPr>
+          <a:xfrm>
+            <a:off x="-75188" y="1760070"/>
             <a:ext cx="1336806" cy="830997"/>
           </a:xfrm>
           <a:prstGeom prst="rect">
@@ -8364,10 +6942,253 @@
                 <a:ea typeface="Android Insomnia" pitchFamily="2" charset="-128"/>
                 <a:cs typeface="Android Insomnia" pitchFamily="2" charset="-128"/>
               </a:rPr>
-              <a:t>A</a:t>
+              <a:t>asf</a:t>
             </a:r>
+            <a:endParaRPr lang="en-GB" sz="4800" b="1">
+              <a:solidFill>
+                <a:schemeClr val="bg1"/>
+              </a:solidFill>
+              <a:latin typeface="Android Insomnia" pitchFamily="2" charset="-128"/>
+              <a:ea typeface="Android Insomnia" pitchFamily="2" charset="-128"/>
+              <a:cs typeface="Android Insomnia" pitchFamily="2" charset="-128"/>
+            </a:endParaRPr>
+          </a:p>
+        </p:txBody>
+      </p:sp>
+    </p:spTree>
+    <p:extLst>
+      <p:ext uri="{BB962C8B-B14F-4D97-AF65-F5344CB8AC3E}">
+        <p14:creationId xmlns:p14="http://schemas.microsoft.com/office/powerpoint/2010/main" val="237684728"/>
+      </p:ext>
+    </p:extLst>
+  </p:cSld>
+  <p:clrMapOvr>
+    <a:masterClrMapping/>
+  </p:clrMapOvr>
+</p:sld>
+</file>
+
+<file path=ppt/slides/slide3.xml><?xml version="1.0" encoding="utf-8"?>
+<p:sld xmlns:a="http://schemas.openxmlformats.org/drawingml/2006/main" xmlns:r="http://schemas.openxmlformats.org/officeDocument/2006/relationships" xmlns:p="http://schemas.openxmlformats.org/presentationml/2006/main">
+  <p:cSld>
+    <p:spTree>
+      <p:nvGrpSpPr>
+        <p:cNvPr id="1" name=""/>
+        <p:cNvGrpSpPr/>
+        <p:nvPr/>
+      </p:nvGrpSpPr>
+      <p:grpSpPr>
+        <a:xfrm>
+          <a:off x="0" y="0"/>
+          <a:ext cx="0" cy="0"/>
+          <a:chOff x="0" y="0"/>
+          <a:chExt cx="0" cy="0"/>
+        </a:xfrm>
+      </p:grpSpPr>
+      <p:sp>
+        <p:nvSpPr>
+          <p:cNvPr id="5" name="Rectangle: Rounded Corners 4">
+            <a:extLst>
+              <a:ext uri="{FF2B5EF4-FFF2-40B4-BE49-F238E27FC236}">
+                <a16:creationId xmlns:a16="http://schemas.microsoft.com/office/drawing/2014/main" id="{4035679B-9375-4A3B-9740-2D1E7E3D6445}"/>
+              </a:ext>
+            </a:extLst>
+          </p:cNvPr>
+          <p:cNvSpPr/>
+          <p:nvPr/>
+        </p:nvSpPr>
+        <p:spPr>
+          <a:xfrm>
+            <a:off x="1" y="2888566"/>
+            <a:ext cx="965996" cy="1391334"/>
+          </a:xfrm>
+          <a:prstGeom prst="roundRect">
+            <a:avLst>
+              <a:gd name="adj" fmla="val 0"/>
+            </a:avLst>
+          </a:prstGeom>
+          <a:solidFill>
+            <a:srgbClr val="5AB1BB"/>
+          </a:solidFill>
+          <a:ln w="101600">
+            <a:noFill/>
+          </a:ln>
+        </p:spPr>
+        <p:style>
+          <a:lnRef idx="2">
+            <a:schemeClr val="accent1">
+              <a:shade val="50000"/>
+            </a:schemeClr>
+          </a:lnRef>
+          <a:fillRef idx="1">
+            <a:schemeClr val="accent1"/>
+          </a:fillRef>
+          <a:effectRef idx="0">
+            <a:schemeClr val="accent1"/>
+          </a:effectRef>
+          <a:fontRef idx="minor">
+            <a:schemeClr val="lt1"/>
+          </a:fontRef>
+        </p:style>
+        <p:txBody>
+          <a:bodyPr rtlCol="0" anchor="ctr"/>
+          <a:lstStyle/>
+          <a:p>
+            <a:pPr algn="ctr"/>
+            <a:endParaRPr lang="en-GB" sz="1808">
+              <a:solidFill>
+                <a:srgbClr val="95BFE5"/>
+              </a:solidFill>
+            </a:endParaRPr>
+          </a:p>
+        </p:txBody>
+      </p:sp>
+      <p:sp>
+        <p:nvSpPr>
+          <p:cNvPr id="7" name="Rectangle: Rounded Corners 6">
+            <a:extLst>
+              <a:ext uri="{FF2B5EF4-FFF2-40B4-BE49-F238E27FC236}">
+                <a16:creationId xmlns:a16="http://schemas.microsoft.com/office/drawing/2014/main" id="{33E43F3B-B6E1-7210-879B-27AFE9595588}"/>
+              </a:ext>
+            </a:extLst>
+          </p:cNvPr>
+          <p:cNvSpPr/>
+          <p:nvPr/>
+        </p:nvSpPr>
+        <p:spPr>
+          <a:xfrm>
+            <a:off x="1" y="0"/>
+            <a:ext cx="965996" cy="2888566"/>
+          </a:xfrm>
+          <a:prstGeom prst="roundRect">
+            <a:avLst>
+              <a:gd name="adj" fmla="val 0"/>
+            </a:avLst>
+          </a:prstGeom>
+          <a:solidFill>
+            <a:srgbClr val="EEB4B3"/>
+          </a:solidFill>
+          <a:ln w="101600">
+            <a:noFill/>
+          </a:ln>
+        </p:spPr>
+        <p:style>
+          <a:lnRef idx="2">
+            <a:schemeClr val="accent1">
+              <a:shade val="50000"/>
+            </a:schemeClr>
+          </a:lnRef>
+          <a:fillRef idx="1">
+            <a:schemeClr val="accent1"/>
+          </a:fillRef>
+          <a:effectRef idx="0">
+            <a:schemeClr val="accent1"/>
+          </a:effectRef>
+          <a:fontRef idx="minor">
+            <a:schemeClr val="lt1"/>
+          </a:fontRef>
+        </p:style>
+        <p:txBody>
+          <a:bodyPr rtlCol="0" anchor="ctr"/>
+          <a:lstStyle/>
+          <a:p>
+            <a:pPr algn="ctr"/>
+            <a:endParaRPr lang="en-GB" sz="1808">
+              <a:solidFill>
+                <a:srgbClr val="95BFE5"/>
+              </a:solidFill>
+            </a:endParaRPr>
+          </a:p>
+        </p:txBody>
+      </p:sp>
+      <p:sp>
+        <p:nvSpPr>
+          <p:cNvPr id="6" name="Rectangle: Rounded Corners 5">
+            <a:extLst>
+              <a:ext uri="{FF2B5EF4-FFF2-40B4-BE49-F238E27FC236}">
+                <a16:creationId xmlns:a16="http://schemas.microsoft.com/office/drawing/2014/main" id="{FEC4D2F5-1B5F-8B94-75B0-128AD20C2F6A}"/>
+              </a:ext>
+            </a:extLst>
+          </p:cNvPr>
+          <p:cNvSpPr/>
+          <p:nvPr/>
+        </p:nvSpPr>
+        <p:spPr>
+          <a:xfrm>
+            <a:off x="965997" y="2888563"/>
+            <a:ext cx="4793997" cy="1391335"/>
+          </a:xfrm>
+          <a:prstGeom prst="roundRect">
+            <a:avLst>
+              <a:gd name="adj" fmla="val 0"/>
+            </a:avLst>
+          </a:prstGeom>
+          <a:solidFill>
+            <a:srgbClr val="7A263A"/>
+          </a:solidFill>
+          <a:ln w="101600">
+            <a:noFill/>
+          </a:ln>
+        </p:spPr>
+        <p:style>
+          <a:lnRef idx="2">
+            <a:schemeClr val="accent1">
+              <a:shade val="50000"/>
+            </a:schemeClr>
+          </a:lnRef>
+          <a:fillRef idx="1">
+            <a:schemeClr val="accent1"/>
+          </a:fillRef>
+          <a:effectRef idx="0">
+            <a:schemeClr val="accent1"/>
+          </a:effectRef>
+          <a:fontRef idx="minor">
+            <a:schemeClr val="lt1"/>
+          </a:fontRef>
+        </p:style>
+        <p:txBody>
+          <a:bodyPr rtlCol="0" anchor="ctr"/>
+          <a:lstStyle/>
+          <a:p>
+            <a:pPr algn="ctr"/>
+            <a:endParaRPr lang="en-GB" sz="1808">
+              <a:solidFill>
+                <a:srgbClr val="95BFE5"/>
+              </a:solidFill>
+            </a:endParaRPr>
+          </a:p>
+        </p:txBody>
+      </p:sp>
+      <p:sp>
+        <p:nvSpPr>
+          <p:cNvPr id="2" name="TextBox 1">
+            <a:extLst>
+              <a:ext uri="{FF2B5EF4-FFF2-40B4-BE49-F238E27FC236}">
+                <a16:creationId xmlns:a16="http://schemas.microsoft.com/office/drawing/2014/main" id="{4D875408-3E42-5D08-7FED-62C7D1F59918}"/>
+              </a:ext>
+            </a:extLst>
+          </p:cNvPr>
+          <p:cNvSpPr txBox="1"/>
+          <p:nvPr/>
+        </p:nvSpPr>
+        <p:spPr>
+          <a:xfrm rot="16200000">
+            <a:off x="-567708" y="1808118"/>
+            <a:ext cx="2262759" cy="1446550"/>
+          </a:xfrm>
+          <a:prstGeom prst="rect">
+            <a:avLst/>
+          </a:prstGeom>
+          <a:noFill/>
+        </p:spPr>
+        <p:txBody>
+          <a:bodyPr wrap="square" rtlCol="0">
+            <a:spAutoFit/>
+          </a:bodyPr>
+          <a:lstStyle/>
+          <a:p>
             <a:r>
-              <a:rPr lang="en-GB" sz="4800" b="1">
+              <a:rPr lang="en-GB" sz="8800" b="1">
                 <a:solidFill>
                   <a:schemeClr val="bg1"/>
                 </a:solidFill>
@@ -8375,15 +7196,1643 @@
                 <a:ea typeface="Android Insomnia" pitchFamily="2" charset="-128"/>
                 <a:cs typeface="Android Insomnia" pitchFamily="2" charset="-128"/>
               </a:rPr>
-              <a:t>SF</a:t>
+              <a:t>asf</a:t>
             </a:r>
+          </a:p>
+        </p:txBody>
+      </p:sp>
+      <p:sp>
+        <p:nvSpPr>
+          <p:cNvPr id="4" name="Rectangle: Rounded Corners 3">
+            <a:extLst>
+              <a:ext uri="{FF2B5EF4-FFF2-40B4-BE49-F238E27FC236}">
+                <a16:creationId xmlns:a16="http://schemas.microsoft.com/office/drawing/2014/main" id="{CAC95C35-1B48-AA1E-545D-C3E97BCC7321}"/>
+              </a:ext>
+            </a:extLst>
+          </p:cNvPr>
+          <p:cNvSpPr/>
+          <p:nvPr/>
+        </p:nvSpPr>
+        <p:spPr>
+          <a:xfrm>
+            <a:off x="965997" y="0"/>
+            <a:ext cx="4793452" cy="2888563"/>
+          </a:xfrm>
+          <a:prstGeom prst="roundRect">
+            <a:avLst>
+              <a:gd name="adj" fmla="val 0"/>
+            </a:avLst>
+          </a:prstGeom>
+          <a:solidFill>
+            <a:srgbClr val="FEC601"/>
+          </a:solidFill>
+          <a:ln w="101600">
+            <a:noFill/>
+          </a:ln>
+        </p:spPr>
+        <p:style>
+          <a:lnRef idx="2">
+            <a:schemeClr val="accent1">
+              <a:shade val="50000"/>
+            </a:schemeClr>
+          </a:lnRef>
+          <a:fillRef idx="1">
+            <a:schemeClr val="accent1"/>
+          </a:fillRef>
+          <a:effectRef idx="0">
+            <a:schemeClr val="accent1"/>
+          </a:effectRef>
+          <a:fontRef idx="minor">
+            <a:schemeClr val="lt1"/>
+          </a:fontRef>
+        </p:style>
+        <p:txBody>
+          <a:bodyPr rtlCol="0" anchor="ctr"/>
+          <a:lstStyle/>
+          <a:p>
+            <a:pPr algn="ctr"/>
+            <a:endParaRPr lang="en-GB" sz="1808">
+              <a:solidFill>
+                <a:srgbClr val="95BFE5"/>
+              </a:solidFill>
+            </a:endParaRPr>
+          </a:p>
+        </p:txBody>
+      </p:sp>
+      <p:sp>
+        <p:nvSpPr>
+          <p:cNvPr id="3" name="TextBox 2">
+            <a:extLst>
+              <a:ext uri="{FF2B5EF4-FFF2-40B4-BE49-F238E27FC236}">
+                <a16:creationId xmlns:a16="http://schemas.microsoft.com/office/drawing/2014/main" id="{56BA9D04-7576-0017-8F07-92AFBC13D6A6}"/>
+              </a:ext>
+            </a:extLst>
+          </p:cNvPr>
+          <p:cNvSpPr txBox="1"/>
+          <p:nvPr/>
+        </p:nvSpPr>
+        <p:spPr>
+          <a:xfrm>
+            <a:off x="188643" y="2444114"/>
+            <a:ext cx="5675652" cy="1446550"/>
+          </a:xfrm>
+          <a:prstGeom prst="rect">
+            <a:avLst/>
+          </a:prstGeom>
+          <a:noFill/>
+        </p:spPr>
+        <p:txBody>
+          <a:bodyPr wrap="square" rtlCol="0">
+            <a:spAutoFit/>
+          </a:bodyPr>
+          <a:lstStyle/>
+          <a:p>
+            <a:r>
+              <a:rPr lang="en-GB" sz="8800" b="1">
+                <a:solidFill>
+                  <a:schemeClr val="bg1"/>
+                </a:solidFill>
+                <a:latin typeface="Android Insomnia" pitchFamily="2" charset="-128"/>
+                <a:ea typeface="Android Insomnia" pitchFamily="2" charset="-128"/>
+                <a:cs typeface="Android Insomnia" pitchFamily="2" charset="-128"/>
+              </a:rPr>
+              <a:t>causeway</a:t>
+            </a:r>
+            <a:endParaRPr lang="en-GB" sz="8800" b="1">
+              <a:solidFill>
+                <a:srgbClr val="7A263A"/>
+              </a:solidFill>
+              <a:latin typeface="Android Insomnia" pitchFamily="2" charset="-128"/>
+              <a:ea typeface="Android Insomnia" pitchFamily="2" charset="-128"/>
+              <a:cs typeface="Android Insomnia" pitchFamily="2" charset="-128"/>
+            </a:endParaRPr>
+          </a:p>
+        </p:txBody>
+      </p:sp>
+      <p:sp>
+        <p:nvSpPr>
+          <p:cNvPr id="8" name="Rectangle 7">
+            <a:extLst>
+              <a:ext uri="{FF2B5EF4-FFF2-40B4-BE49-F238E27FC236}">
+                <a16:creationId xmlns:a16="http://schemas.microsoft.com/office/drawing/2014/main" id="{5D4276C9-F9BD-8619-EB66-DEB5749921FA}"/>
+              </a:ext>
+            </a:extLst>
+          </p:cNvPr>
+          <p:cNvSpPr/>
+          <p:nvPr/>
+        </p:nvSpPr>
+        <p:spPr>
+          <a:xfrm>
+            <a:off x="953751" y="0"/>
+            <a:ext cx="18000" cy="4279900"/>
+          </a:xfrm>
+          <a:prstGeom prst="rect">
+            <a:avLst/>
+          </a:prstGeom>
+          <a:solidFill>
+            <a:schemeClr val="bg1"/>
+          </a:solidFill>
+          <a:ln>
+            <a:noFill/>
+          </a:ln>
+        </p:spPr>
+        <p:style>
+          <a:lnRef idx="2">
+            <a:schemeClr val="accent1">
+              <a:shade val="50000"/>
+            </a:schemeClr>
+          </a:lnRef>
+          <a:fillRef idx="1">
+            <a:schemeClr val="accent1"/>
+          </a:fillRef>
+          <a:effectRef idx="0">
+            <a:schemeClr val="accent1"/>
+          </a:effectRef>
+          <a:fontRef idx="minor">
+            <a:schemeClr val="lt1"/>
+          </a:fontRef>
+        </p:style>
+        <p:txBody>
+          <a:bodyPr rtlCol="0" anchor="ctr"/>
+          <a:lstStyle/>
+          <a:p>
+            <a:pPr algn="ctr"/>
+            <a:endParaRPr lang="en-GB"/>
+          </a:p>
+        </p:txBody>
+      </p:sp>
+      <p:sp>
+        <p:nvSpPr>
+          <p:cNvPr id="9" name="Rectangle 8">
+            <a:extLst>
+              <a:ext uri="{FF2B5EF4-FFF2-40B4-BE49-F238E27FC236}">
+                <a16:creationId xmlns:a16="http://schemas.microsoft.com/office/drawing/2014/main" id="{E4D5289E-5595-F824-BC85-D610EDDC6522}"/>
+              </a:ext>
+            </a:extLst>
+          </p:cNvPr>
+          <p:cNvSpPr/>
+          <p:nvPr/>
+        </p:nvSpPr>
+        <p:spPr>
+          <a:xfrm rot="16200000" flipH="1">
+            <a:off x="2870723" y="3336"/>
+            <a:ext cx="18000" cy="5759448"/>
+          </a:xfrm>
+          <a:prstGeom prst="rect">
+            <a:avLst/>
+          </a:prstGeom>
+          <a:solidFill>
+            <a:schemeClr val="bg1"/>
+          </a:solidFill>
+          <a:ln>
+            <a:noFill/>
+          </a:ln>
+        </p:spPr>
+        <p:style>
+          <a:lnRef idx="2">
+            <a:schemeClr val="accent1">
+              <a:shade val="50000"/>
+            </a:schemeClr>
+          </a:lnRef>
+          <a:fillRef idx="1">
+            <a:schemeClr val="accent1"/>
+          </a:fillRef>
+          <a:effectRef idx="0">
+            <a:schemeClr val="accent1"/>
+          </a:effectRef>
+          <a:fontRef idx="minor">
+            <a:schemeClr val="lt1"/>
+          </a:fontRef>
+        </p:style>
+        <p:txBody>
+          <a:bodyPr rtlCol="0" anchor="ctr"/>
+          <a:lstStyle/>
+          <a:p>
+            <a:pPr algn="ctr"/>
+            <a:endParaRPr lang="en-GB"/>
           </a:p>
         </p:txBody>
       </p:sp>
     </p:spTree>
     <p:extLst>
       <p:ext uri="{BB962C8B-B14F-4D97-AF65-F5344CB8AC3E}">
-        <p14:creationId xmlns:p14="http://schemas.microsoft.com/office/powerpoint/2010/main" val="4158817270"/>
+        <p14:creationId xmlns:p14="http://schemas.microsoft.com/office/powerpoint/2010/main" val="1224057133"/>
+      </p:ext>
+    </p:extLst>
+  </p:cSld>
+  <p:clrMapOvr>
+    <a:masterClrMapping/>
+  </p:clrMapOvr>
+</p:sld>
+</file>
+
+<file path=ppt/slides/slide4.xml><?xml version="1.0" encoding="utf-8"?>
+<p:sld xmlns:a="http://schemas.openxmlformats.org/drawingml/2006/main" xmlns:r="http://schemas.openxmlformats.org/officeDocument/2006/relationships" xmlns:p="http://schemas.openxmlformats.org/presentationml/2006/main">
+  <p:cSld>
+    <p:spTree>
+      <p:nvGrpSpPr>
+        <p:cNvPr id="1" name=""/>
+        <p:cNvGrpSpPr/>
+        <p:nvPr/>
+      </p:nvGrpSpPr>
+      <p:grpSpPr>
+        <a:xfrm>
+          <a:off x="0" y="0"/>
+          <a:ext cx="0" cy="0"/>
+          <a:chOff x="0" y="0"/>
+          <a:chExt cx="0" cy="0"/>
+        </a:xfrm>
+      </p:grpSpPr>
+      <p:sp>
+        <p:nvSpPr>
+          <p:cNvPr id="5" name="Rectangle: Rounded Corners 4">
+            <a:extLst>
+              <a:ext uri="{FF2B5EF4-FFF2-40B4-BE49-F238E27FC236}">
+                <a16:creationId xmlns:a16="http://schemas.microsoft.com/office/drawing/2014/main" id="{4035679B-9375-4A3B-9740-2D1E7E3D6445}"/>
+              </a:ext>
+            </a:extLst>
+          </p:cNvPr>
+          <p:cNvSpPr/>
+          <p:nvPr/>
+        </p:nvSpPr>
+        <p:spPr>
+          <a:xfrm>
+            <a:off x="1" y="2888566"/>
+            <a:ext cx="965996" cy="1391334"/>
+          </a:xfrm>
+          <a:prstGeom prst="roundRect">
+            <a:avLst>
+              <a:gd name="adj" fmla="val 0"/>
+            </a:avLst>
+          </a:prstGeom>
+          <a:solidFill>
+            <a:srgbClr val="5AB1BB"/>
+          </a:solidFill>
+          <a:ln w="101600">
+            <a:noFill/>
+          </a:ln>
+        </p:spPr>
+        <p:style>
+          <a:lnRef idx="2">
+            <a:schemeClr val="accent1">
+              <a:shade val="50000"/>
+            </a:schemeClr>
+          </a:lnRef>
+          <a:fillRef idx="1">
+            <a:schemeClr val="accent1"/>
+          </a:fillRef>
+          <a:effectRef idx="0">
+            <a:schemeClr val="accent1"/>
+          </a:effectRef>
+          <a:fontRef idx="minor">
+            <a:schemeClr val="lt1"/>
+          </a:fontRef>
+        </p:style>
+        <p:txBody>
+          <a:bodyPr rtlCol="0" anchor="ctr"/>
+          <a:lstStyle/>
+          <a:p>
+            <a:pPr algn="ctr"/>
+            <a:endParaRPr lang="en-GB" sz="1808">
+              <a:solidFill>
+                <a:srgbClr val="95BFE5"/>
+              </a:solidFill>
+            </a:endParaRPr>
+          </a:p>
+        </p:txBody>
+      </p:sp>
+      <p:sp>
+        <p:nvSpPr>
+          <p:cNvPr id="7" name="Rectangle: Rounded Corners 6">
+            <a:extLst>
+              <a:ext uri="{FF2B5EF4-FFF2-40B4-BE49-F238E27FC236}">
+                <a16:creationId xmlns:a16="http://schemas.microsoft.com/office/drawing/2014/main" id="{33E43F3B-B6E1-7210-879B-27AFE9595588}"/>
+              </a:ext>
+            </a:extLst>
+          </p:cNvPr>
+          <p:cNvSpPr/>
+          <p:nvPr/>
+        </p:nvSpPr>
+        <p:spPr>
+          <a:xfrm>
+            <a:off x="1" y="0"/>
+            <a:ext cx="965996" cy="2888566"/>
+          </a:xfrm>
+          <a:prstGeom prst="roundRect">
+            <a:avLst>
+              <a:gd name="adj" fmla="val 0"/>
+            </a:avLst>
+          </a:prstGeom>
+          <a:solidFill>
+            <a:srgbClr val="EEB4B3"/>
+          </a:solidFill>
+          <a:ln w="101600">
+            <a:noFill/>
+          </a:ln>
+        </p:spPr>
+        <p:style>
+          <a:lnRef idx="2">
+            <a:schemeClr val="accent1">
+              <a:shade val="50000"/>
+            </a:schemeClr>
+          </a:lnRef>
+          <a:fillRef idx="1">
+            <a:schemeClr val="accent1"/>
+          </a:fillRef>
+          <a:effectRef idx="0">
+            <a:schemeClr val="accent1"/>
+          </a:effectRef>
+          <a:fontRef idx="minor">
+            <a:schemeClr val="lt1"/>
+          </a:fontRef>
+        </p:style>
+        <p:txBody>
+          <a:bodyPr rtlCol="0" anchor="ctr"/>
+          <a:lstStyle/>
+          <a:p>
+            <a:pPr algn="ctr"/>
+            <a:endParaRPr lang="en-GB" sz="1808">
+              <a:solidFill>
+                <a:srgbClr val="95BFE5"/>
+              </a:solidFill>
+            </a:endParaRPr>
+          </a:p>
+        </p:txBody>
+      </p:sp>
+      <p:sp>
+        <p:nvSpPr>
+          <p:cNvPr id="6" name="Rectangle: Rounded Corners 5">
+            <a:extLst>
+              <a:ext uri="{FF2B5EF4-FFF2-40B4-BE49-F238E27FC236}">
+                <a16:creationId xmlns:a16="http://schemas.microsoft.com/office/drawing/2014/main" id="{FEC4D2F5-1B5F-8B94-75B0-128AD20C2F6A}"/>
+              </a:ext>
+            </a:extLst>
+          </p:cNvPr>
+          <p:cNvSpPr/>
+          <p:nvPr/>
+        </p:nvSpPr>
+        <p:spPr>
+          <a:xfrm>
+            <a:off x="965997" y="2888563"/>
+            <a:ext cx="4793997" cy="1391335"/>
+          </a:xfrm>
+          <a:prstGeom prst="roundRect">
+            <a:avLst>
+              <a:gd name="adj" fmla="val 0"/>
+            </a:avLst>
+          </a:prstGeom>
+          <a:solidFill>
+            <a:srgbClr val="7A263A"/>
+          </a:solidFill>
+          <a:ln w="101600">
+            <a:noFill/>
+          </a:ln>
+        </p:spPr>
+        <p:style>
+          <a:lnRef idx="2">
+            <a:schemeClr val="accent1">
+              <a:shade val="50000"/>
+            </a:schemeClr>
+          </a:lnRef>
+          <a:fillRef idx="1">
+            <a:schemeClr val="accent1"/>
+          </a:fillRef>
+          <a:effectRef idx="0">
+            <a:schemeClr val="accent1"/>
+          </a:effectRef>
+          <a:fontRef idx="minor">
+            <a:schemeClr val="lt1"/>
+          </a:fontRef>
+        </p:style>
+        <p:txBody>
+          <a:bodyPr rtlCol="0" anchor="ctr"/>
+          <a:lstStyle/>
+          <a:p>
+            <a:pPr algn="ctr"/>
+            <a:endParaRPr lang="en-GB" sz="1808">
+              <a:solidFill>
+                <a:srgbClr val="95BFE5"/>
+              </a:solidFill>
+            </a:endParaRPr>
+          </a:p>
+        </p:txBody>
+      </p:sp>
+      <p:sp>
+        <p:nvSpPr>
+          <p:cNvPr id="2" name="TextBox 1">
+            <a:extLst>
+              <a:ext uri="{FF2B5EF4-FFF2-40B4-BE49-F238E27FC236}">
+                <a16:creationId xmlns:a16="http://schemas.microsoft.com/office/drawing/2014/main" id="{4D875408-3E42-5D08-7FED-62C7D1F59918}"/>
+              </a:ext>
+            </a:extLst>
+          </p:cNvPr>
+          <p:cNvSpPr txBox="1"/>
+          <p:nvPr/>
+        </p:nvSpPr>
+        <p:spPr>
+          <a:xfrm rot="16200000">
+            <a:off x="-567708" y="1808118"/>
+            <a:ext cx="2262759" cy="1446550"/>
+          </a:xfrm>
+          <a:prstGeom prst="rect">
+            <a:avLst/>
+          </a:prstGeom>
+          <a:noFill/>
+        </p:spPr>
+        <p:txBody>
+          <a:bodyPr wrap="square" rtlCol="0">
+            <a:spAutoFit/>
+          </a:bodyPr>
+          <a:lstStyle/>
+          <a:p>
+            <a:r>
+              <a:rPr lang="en-GB" sz="8800" b="1">
+                <a:solidFill>
+                  <a:schemeClr val="bg1"/>
+                </a:solidFill>
+                <a:latin typeface="Android Insomnia" pitchFamily="2" charset="-128"/>
+                <a:ea typeface="Android Insomnia" pitchFamily="2" charset="-128"/>
+                <a:cs typeface="Android Insomnia" pitchFamily="2" charset="-128"/>
+              </a:rPr>
+              <a:t>asf</a:t>
+            </a:r>
+          </a:p>
+        </p:txBody>
+      </p:sp>
+      <p:sp>
+        <p:nvSpPr>
+          <p:cNvPr id="4" name="Rectangle: Rounded Corners 3">
+            <a:extLst>
+              <a:ext uri="{FF2B5EF4-FFF2-40B4-BE49-F238E27FC236}">
+                <a16:creationId xmlns:a16="http://schemas.microsoft.com/office/drawing/2014/main" id="{CAC95C35-1B48-AA1E-545D-C3E97BCC7321}"/>
+              </a:ext>
+            </a:extLst>
+          </p:cNvPr>
+          <p:cNvSpPr/>
+          <p:nvPr/>
+        </p:nvSpPr>
+        <p:spPr>
+          <a:xfrm>
+            <a:off x="965997" y="0"/>
+            <a:ext cx="4793452" cy="2888563"/>
+          </a:xfrm>
+          <a:prstGeom prst="roundRect">
+            <a:avLst>
+              <a:gd name="adj" fmla="val 0"/>
+            </a:avLst>
+          </a:prstGeom>
+          <a:solidFill>
+            <a:srgbClr val="FEC601"/>
+          </a:solidFill>
+          <a:ln w="101600">
+            <a:noFill/>
+          </a:ln>
+        </p:spPr>
+        <p:style>
+          <a:lnRef idx="2">
+            <a:schemeClr val="accent1">
+              <a:shade val="50000"/>
+            </a:schemeClr>
+          </a:lnRef>
+          <a:fillRef idx="1">
+            <a:schemeClr val="accent1"/>
+          </a:fillRef>
+          <a:effectRef idx="0">
+            <a:schemeClr val="accent1"/>
+          </a:effectRef>
+          <a:fontRef idx="minor">
+            <a:schemeClr val="lt1"/>
+          </a:fontRef>
+        </p:style>
+        <p:txBody>
+          <a:bodyPr rtlCol="0" anchor="ctr"/>
+          <a:lstStyle/>
+          <a:p>
+            <a:pPr algn="ctr"/>
+            <a:endParaRPr lang="en-GB" sz="1808">
+              <a:solidFill>
+                <a:srgbClr val="95BFE5"/>
+              </a:solidFill>
+            </a:endParaRPr>
+          </a:p>
+        </p:txBody>
+      </p:sp>
+      <p:sp>
+        <p:nvSpPr>
+          <p:cNvPr id="3" name="TextBox 2">
+            <a:extLst>
+              <a:ext uri="{FF2B5EF4-FFF2-40B4-BE49-F238E27FC236}">
+                <a16:creationId xmlns:a16="http://schemas.microsoft.com/office/drawing/2014/main" id="{56BA9D04-7576-0017-8F07-92AFBC13D6A6}"/>
+              </a:ext>
+            </a:extLst>
+          </p:cNvPr>
+          <p:cNvSpPr txBox="1"/>
+          <p:nvPr/>
+        </p:nvSpPr>
+        <p:spPr>
+          <a:xfrm>
+            <a:off x="188643" y="2444114"/>
+            <a:ext cx="5675652" cy="1446550"/>
+          </a:xfrm>
+          <a:prstGeom prst="rect">
+            <a:avLst/>
+          </a:prstGeom>
+          <a:noFill/>
+        </p:spPr>
+        <p:txBody>
+          <a:bodyPr wrap="square" rtlCol="0">
+            <a:spAutoFit/>
+          </a:bodyPr>
+          <a:lstStyle/>
+          <a:p>
+            <a:r>
+              <a:rPr lang="en-GB" sz="8800" b="1">
+                <a:solidFill>
+                  <a:schemeClr val="bg1"/>
+                </a:solidFill>
+                <a:latin typeface="Android Insomnia" pitchFamily="2" charset="-128"/>
+                <a:ea typeface="Android Insomnia" pitchFamily="2" charset="-128"/>
+                <a:cs typeface="Android Insomnia" pitchFamily="2" charset="-128"/>
+              </a:rPr>
+              <a:t>causeway</a:t>
+            </a:r>
+            <a:endParaRPr lang="en-GB" sz="8800" b="1">
+              <a:solidFill>
+                <a:srgbClr val="7A263A"/>
+              </a:solidFill>
+              <a:latin typeface="Android Insomnia" pitchFamily="2" charset="-128"/>
+              <a:ea typeface="Android Insomnia" pitchFamily="2" charset="-128"/>
+              <a:cs typeface="Android Insomnia" pitchFamily="2" charset="-128"/>
+            </a:endParaRPr>
+          </a:p>
+        </p:txBody>
+      </p:sp>
+    </p:spTree>
+    <p:extLst>
+      <p:ext uri="{BB962C8B-B14F-4D97-AF65-F5344CB8AC3E}">
+        <p14:creationId xmlns:p14="http://schemas.microsoft.com/office/powerpoint/2010/main" val="801946939"/>
+      </p:ext>
+    </p:extLst>
+  </p:cSld>
+  <p:clrMapOvr>
+    <a:masterClrMapping/>
+  </p:clrMapOvr>
+</p:sld>
+</file>
+
+<file path=ppt/slides/slide5.xml><?xml version="1.0" encoding="utf-8"?>
+<p:sld xmlns:a="http://schemas.openxmlformats.org/drawingml/2006/main" xmlns:r="http://schemas.openxmlformats.org/officeDocument/2006/relationships" xmlns:p="http://schemas.openxmlformats.org/presentationml/2006/main">
+  <p:cSld>
+    <p:spTree>
+      <p:nvGrpSpPr>
+        <p:cNvPr id="1" name=""/>
+        <p:cNvGrpSpPr/>
+        <p:nvPr/>
+      </p:nvGrpSpPr>
+      <p:grpSpPr>
+        <a:xfrm>
+          <a:off x="0" y="0"/>
+          <a:ext cx="0" cy="0"/>
+          <a:chOff x="0" y="0"/>
+          <a:chExt cx="0" cy="0"/>
+        </a:xfrm>
+      </p:grpSpPr>
+      <p:sp>
+        <p:nvSpPr>
+          <p:cNvPr id="12" name="Rectangle: Rounded Corners 11">
+            <a:extLst>
+              <a:ext uri="{FF2B5EF4-FFF2-40B4-BE49-F238E27FC236}">
+                <a16:creationId xmlns:a16="http://schemas.microsoft.com/office/drawing/2014/main" id="{A31F33E6-48C6-2F14-D301-2E0B7985B91A}"/>
+              </a:ext>
+            </a:extLst>
+          </p:cNvPr>
+          <p:cNvSpPr/>
+          <p:nvPr/>
+        </p:nvSpPr>
+        <p:spPr>
+          <a:xfrm>
+            <a:off x="0" y="0"/>
+            <a:ext cx="1138136" cy="2509736"/>
+          </a:xfrm>
+          <a:prstGeom prst="roundRect">
+            <a:avLst>
+              <a:gd name="adj" fmla="val 0"/>
+            </a:avLst>
+          </a:prstGeom>
+          <a:solidFill>
+            <a:srgbClr val="EEB4B3"/>
+          </a:solidFill>
+          <a:ln w="101600">
+            <a:noFill/>
+          </a:ln>
+        </p:spPr>
+        <p:style>
+          <a:lnRef idx="2">
+            <a:schemeClr val="accent1">
+              <a:shade val="50000"/>
+            </a:schemeClr>
+          </a:lnRef>
+          <a:fillRef idx="1">
+            <a:schemeClr val="accent1"/>
+          </a:fillRef>
+          <a:effectRef idx="0">
+            <a:schemeClr val="accent1"/>
+          </a:effectRef>
+          <a:fontRef idx="minor">
+            <a:schemeClr val="lt1"/>
+          </a:fontRef>
+        </p:style>
+        <p:txBody>
+          <a:bodyPr rtlCol="0" anchor="ctr"/>
+          <a:lstStyle/>
+          <a:p>
+            <a:pPr algn="ctr"/>
+            <a:endParaRPr lang="en-GB" sz="1808">
+              <a:solidFill>
+                <a:srgbClr val="95BFE5"/>
+              </a:solidFill>
+            </a:endParaRPr>
+          </a:p>
+        </p:txBody>
+      </p:sp>
+      <p:sp>
+        <p:nvSpPr>
+          <p:cNvPr id="6" name="Rectangle: Rounded Corners 5">
+            <a:extLst>
+              <a:ext uri="{FF2B5EF4-FFF2-40B4-BE49-F238E27FC236}">
+                <a16:creationId xmlns:a16="http://schemas.microsoft.com/office/drawing/2014/main" id="{FEC4D2F5-1B5F-8B94-75B0-128AD20C2F6A}"/>
+              </a:ext>
+            </a:extLst>
+          </p:cNvPr>
+          <p:cNvSpPr/>
+          <p:nvPr/>
+        </p:nvSpPr>
+        <p:spPr>
+          <a:xfrm>
+            <a:off x="1175372" y="2544866"/>
+            <a:ext cx="4584078" cy="1735034"/>
+          </a:xfrm>
+          <a:prstGeom prst="roundRect">
+            <a:avLst>
+              <a:gd name="adj" fmla="val 0"/>
+            </a:avLst>
+          </a:prstGeom>
+          <a:solidFill>
+            <a:srgbClr val="7A263A"/>
+          </a:solidFill>
+          <a:ln w="101600">
+            <a:noFill/>
+          </a:ln>
+        </p:spPr>
+        <p:style>
+          <a:lnRef idx="2">
+            <a:schemeClr val="accent1">
+              <a:shade val="50000"/>
+            </a:schemeClr>
+          </a:lnRef>
+          <a:fillRef idx="1">
+            <a:schemeClr val="accent1"/>
+          </a:fillRef>
+          <a:effectRef idx="0">
+            <a:schemeClr val="accent1"/>
+          </a:effectRef>
+          <a:fontRef idx="minor">
+            <a:schemeClr val="lt1"/>
+          </a:fontRef>
+        </p:style>
+        <p:txBody>
+          <a:bodyPr rtlCol="0" anchor="ctr"/>
+          <a:lstStyle/>
+          <a:p>
+            <a:pPr algn="ctr"/>
+            <a:endParaRPr lang="en-GB" sz="1808">
+              <a:solidFill>
+                <a:srgbClr val="95BFE5"/>
+              </a:solidFill>
+            </a:endParaRPr>
+          </a:p>
+        </p:txBody>
+      </p:sp>
+      <p:sp>
+        <p:nvSpPr>
+          <p:cNvPr id="4" name="Rectangle: Rounded Corners 3">
+            <a:extLst>
+              <a:ext uri="{FF2B5EF4-FFF2-40B4-BE49-F238E27FC236}">
+                <a16:creationId xmlns:a16="http://schemas.microsoft.com/office/drawing/2014/main" id="{CAC95C35-1B48-AA1E-545D-C3E97BCC7321}"/>
+              </a:ext>
+            </a:extLst>
+          </p:cNvPr>
+          <p:cNvSpPr/>
+          <p:nvPr/>
+        </p:nvSpPr>
+        <p:spPr>
+          <a:xfrm>
+            <a:off x="1175372" y="-13959"/>
+            <a:ext cx="4584078" cy="2516715"/>
+          </a:xfrm>
+          <a:prstGeom prst="roundRect">
+            <a:avLst>
+              <a:gd name="adj" fmla="val 0"/>
+            </a:avLst>
+          </a:prstGeom>
+          <a:solidFill>
+            <a:srgbClr val="FEC601"/>
+          </a:solidFill>
+          <a:ln w="101600">
+            <a:noFill/>
+          </a:ln>
+        </p:spPr>
+        <p:style>
+          <a:lnRef idx="2">
+            <a:schemeClr val="accent1">
+              <a:shade val="50000"/>
+            </a:schemeClr>
+          </a:lnRef>
+          <a:fillRef idx="1">
+            <a:schemeClr val="accent1"/>
+          </a:fillRef>
+          <a:effectRef idx="0">
+            <a:schemeClr val="accent1"/>
+          </a:effectRef>
+          <a:fontRef idx="minor">
+            <a:schemeClr val="lt1"/>
+          </a:fontRef>
+        </p:style>
+        <p:txBody>
+          <a:bodyPr rtlCol="0" anchor="ctr"/>
+          <a:lstStyle/>
+          <a:p>
+            <a:pPr algn="ctr"/>
+            <a:endParaRPr lang="en-GB" sz="1808">
+              <a:solidFill>
+                <a:srgbClr val="95BFE5"/>
+              </a:solidFill>
+            </a:endParaRPr>
+          </a:p>
+        </p:txBody>
+      </p:sp>
+      <p:sp>
+        <p:nvSpPr>
+          <p:cNvPr id="5" name="Rectangle: Rounded Corners 4">
+            <a:extLst>
+              <a:ext uri="{FF2B5EF4-FFF2-40B4-BE49-F238E27FC236}">
+                <a16:creationId xmlns:a16="http://schemas.microsoft.com/office/drawing/2014/main" id="{4035679B-9375-4A3B-9740-2D1E7E3D6445}"/>
+              </a:ext>
+            </a:extLst>
+          </p:cNvPr>
+          <p:cNvSpPr/>
+          <p:nvPr/>
+        </p:nvSpPr>
+        <p:spPr>
+          <a:xfrm>
+            <a:off x="0" y="2544866"/>
+            <a:ext cx="1138136" cy="1735034"/>
+          </a:xfrm>
+          <a:prstGeom prst="roundRect">
+            <a:avLst>
+              <a:gd name="adj" fmla="val 0"/>
+            </a:avLst>
+          </a:prstGeom>
+          <a:solidFill>
+            <a:srgbClr val="5AB1BB"/>
+          </a:solidFill>
+          <a:ln w="101600">
+            <a:noFill/>
+          </a:ln>
+        </p:spPr>
+        <p:style>
+          <a:lnRef idx="2">
+            <a:schemeClr val="accent1">
+              <a:shade val="50000"/>
+            </a:schemeClr>
+          </a:lnRef>
+          <a:fillRef idx="1">
+            <a:schemeClr val="accent1"/>
+          </a:fillRef>
+          <a:effectRef idx="0">
+            <a:schemeClr val="accent1"/>
+          </a:effectRef>
+          <a:fontRef idx="minor">
+            <a:schemeClr val="lt1"/>
+          </a:fontRef>
+        </p:style>
+        <p:txBody>
+          <a:bodyPr rtlCol="0" anchor="ctr"/>
+          <a:lstStyle/>
+          <a:p>
+            <a:pPr algn="ctr"/>
+            <a:endParaRPr lang="en-GB" sz="1808">
+              <a:solidFill>
+                <a:srgbClr val="95BFE5"/>
+              </a:solidFill>
+            </a:endParaRPr>
+          </a:p>
+        </p:txBody>
+      </p:sp>
+      <p:sp>
+        <p:nvSpPr>
+          <p:cNvPr id="3" name="TextBox 2">
+            <a:extLst>
+              <a:ext uri="{FF2B5EF4-FFF2-40B4-BE49-F238E27FC236}">
+                <a16:creationId xmlns:a16="http://schemas.microsoft.com/office/drawing/2014/main" id="{56BA9D04-7576-0017-8F07-92AFBC13D6A6}"/>
+              </a:ext>
+            </a:extLst>
+          </p:cNvPr>
+          <p:cNvSpPr txBox="1"/>
+          <p:nvPr/>
+        </p:nvSpPr>
+        <p:spPr>
+          <a:xfrm>
+            <a:off x="1155920" y="2351235"/>
+            <a:ext cx="4584078" cy="1200329"/>
+          </a:xfrm>
+          <a:prstGeom prst="rect">
+            <a:avLst/>
+          </a:prstGeom>
+          <a:noFill/>
+        </p:spPr>
+        <p:txBody>
+          <a:bodyPr wrap="square" rtlCol="0">
+            <a:spAutoFit/>
+          </a:bodyPr>
+          <a:lstStyle/>
+          <a:p>
+            <a:r>
+              <a:rPr lang="en-GB" sz="7200" b="1">
+                <a:solidFill>
+                  <a:schemeClr val="bg1"/>
+                </a:solidFill>
+                <a:latin typeface="Android Insomnia" pitchFamily="2" charset="-128"/>
+                <a:ea typeface="Android Insomnia" pitchFamily="2" charset="-128"/>
+                <a:cs typeface="Android Insomnia" pitchFamily="2" charset="-128"/>
+              </a:rPr>
+              <a:t>causeway</a:t>
+            </a:r>
+          </a:p>
+        </p:txBody>
+      </p:sp>
+      <p:sp>
+        <p:nvSpPr>
+          <p:cNvPr id="10" name="TextBox 9">
+            <a:extLst>
+              <a:ext uri="{FF2B5EF4-FFF2-40B4-BE49-F238E27FC236}">
+                <a16:creationId xmlns:a16="http://schemas.microsoft.com/office/drawing/2014/main" id="{C64F2FFB-CDB5-6BCD-6256-EE2A05FDCE17}"/>
+              </a:ext>
+            </a:extLst>
+          </p:cNvPr>
+          <p:cNvSpPr txBox="1"/>
+          <p:nvPr/>
+        </p:nvSpPr>
+        <p:spPr>
+          <a:xfrm>
+            <a:off x="-75188" y="1760070"/>
+            <a:ext cx="1336806" cy="830997"/>
+          </a:xfrm>
+          <a:prstGeom prst="rect">
+            <a:avLst/>
+          </a:prstGeom>
+          <a:noFill/>
+        </p:spPr>
+        <p:txBody>
+          <a:bodyPr wrap="square" rtlCol="0">
+            <a:spAutoFit/>
+          </a:bodyPr>
+          <a:lstStyle/>
+          <a:p>
+            <a:r>
+              <a:rPr lang="en-US" sz="4800" b="1">
+                <a:solidFill>
+                  <a:schemeClr val="bg1"/>
+                </a:solidFill>
+                <a:latin typeface="Android Insomnia" pitchFamily="2" charset="-128"/>
+                <a:ea typeface="Android Insomnia" pitchFamily="2" charset="-128"/>
+                <a:cs typeface="Android Insomnia" pitchFamily="2" charset="-128"/>
+              </a:rPr>
+              <a:t>asf</a:t>
+            </a:r>
+            <a:endParaRPr lang="en-GB" sz="4800" b="1">
+              <a:solidFill>
+                <a:schemeClr val="bg1"/>
+              </a:solidFill>
+              <a:latin typeface="Android Insomnia" pitchFamily="2" charset="-128"/>
+              <a:ea typeface="Android Insomnia" pitchFamily="2" charset="-128"/>
+              <a:cs typeface="Android Insomnia" pitchFamily="2" charset="-128"/>
+            </a:endParaRPr>
+          </a:p>
+        </p:txBody>
+      </p:sp>
+    </p:spTree>
+    <p:extLst>
+      <p:ext uri="{BB962C8B-B14F-4D97-AF65-F5344CB8AC3E}">
+        <p14:creationId xmlns:p14="http://schemas.microsoft.com/office/powerpoint/2010/main" val="494928356"/>
+      </p:ext>
+    </p:extLst>
+  </p:cSld>
+  <p:clrMapOvr>
+    <a:masterClrMapping/>
+  </p:clrMapOvr>
+</p:sld>
+</file>
+
+<file path=ppt/slides/slide6.xml><?xml version="1.0" encoding="utf-8"?>
+<p:sld xmlns:a="http://schemas.openxmlformats.org/drawingml/2006/main" xmlns:r="http://schemas.openxmlformats.org/officeDocument/2006/relationships" xmlns:p="http://schemas.openxmlformats.org/presentationml/2006/main">
+  <p:cSld>
+    <p:spTree>
+      <p:nvGrpSpPr>
+        <p:cNvPr id="1" name=""/>
+        <p:cNvGrpSpPr/>
+        <p:nvPr/>
+      </p:nvGrpSpPr>
+      <p:grpSpPr>
+        <a:xfrm>
+          <a:off x="0" y="0"/>
+          <a:ext cx="0" cy="0"/>
+          <a:chOff x="0" y="0"/>
+          <a:chExt cx="0" cy="0"/>
+        </a:xfrm>
+      </p:grpSpPr>
+      <p:sp>
+        <p:nvSpPr>
+          <p:cNvPr id="12" name="Rectangle: Rounded Corners 11">
+            <a:extLst>
+              <a:ext uri="{FF2B5EF4-FFF2-40B4-BE49-F238E27FC236}">
+                <a16:creationId xmlns:a16="http://schemas.microsoft.com/office/drawing/2014/main" id="{A31F33E6-48C6-2F14-D301-2E0B7985B91A}"/>
+              </a:ext>
+            </a:extLst>
+          </p:cNvPr>
+          <p:cNvSpPr/>
+          <p:nvPr/>
+        </p:nvSpPr>
+        <p:spPr>
+          <a:xfrm>
+            <a:off x="0" y="0"/>
+            <a:ext cx="1138136" cy="2509736"/>
+          </a:xfrm>
+          <a:prstGeom prst="roundRect">
+            <a:avLst>
+              <a:gd name="adj" fmla="val 0"/>
+            </a:avLst>
+          </a:prstGeom>
+          <a:solidFill>
+            <a:srgbClr val="EEB4B3"/>
+          </a:solidFill>
+          <a:ln w="101600">
+            <a:noFill/>
+          </a:ln>
+        </p:spPr>
+        <p:style>
+          <a:lnRef idx="2">
+            <a:schemeClr val="accent1">
+              <a:shade val="50000"/>
+            </a:schemeClr>
+          </a:lnRef>
+          <a:fillRef idx="1">
+            <a:schemeClr val="accent1"/>
+          </a:fillRef>
+          <a:effectRef idx="0">
+            <a:schemeClr val="accent1"/>
+          </a:effectRef>
+          <a:fontRef idx="minor">
+            <a:schemeClr val="lt1"/>
+          </a:fontRef>
+        </p:style>
+        <p:txBody>
+          <a:bodyPr rtlCol="0" anchor="ctr"/>
+          <a:lstStyle/>
+          <a:p>
+            <a:pPr algn="ctr"/>
+            <a:endParaRPr lang="en-GB" sz="1808">
+              <a:solidFill>
+                <a:srgbClr val="95BFE5"/>
+              </a:solidFill>
+            </a:endParaRPr>
+          </a:p>
+        </p:txBody>
+      </p:sp>
+      <p:sp>
+        <p:nvSpPr>
+          <p:cNvPr id="6" name="Rectangle: Rounded Corners 5">
+            <a:extLst>
+              <a:ext uri="{FF2B5EF4-FFF2-40B4-BE49-F238E27FC236}">
+                <a16:creationId xmlns:a16="http://schemas.microsoft.com/office/drawing/2014/main" id="{FEC4D2F5-1B5F-8B94-75B0-128AD20C2F6A}"/>
+              </a:ext>
+            </a:extLst>
+          </p:cNvPr>
+          <p:cNvSpPr/>
+          <p:nvPr/>
+        </p:nvSpPr>
+        <p:spPr>
+          <a:xfrm>
+            <a:off x="1175372" y="2544866"/>
+            <a:ext cx="4584078" cy="1750564"/>
+          </a:xfrm>
+          <a:prstGeom prst="roundRect">
+            <a:avLst>
+              <a:gd name="adj" fmla="val 0"/>
+            </a:avLst>
+          </a:prstGeom>
+          <a:solidFill>
+            <a:srgbClr val="7A263A"/>
+          </a:solidFill>
+          <a:ln w="101600">
+            <a:noFill/>
+          </a:ln>
+        </p:spPr>
+        <p:style>
+          <a:lnRef idx="2">
+            <a:schemeClr val="accent1">
+              <a:shade val="50000"/>
+            </a:schemeClr>
+          </a:lnRef>
+          <a:fillRef idx="1">
+            <a:schemeClr val="accent1"/>
+          </a:fillRef>
+          <a:effectRef idx="0">
+            <a:schemeClr val="accent1"/>
+          </a:effectRef>
+          <a:fontRef idx="minor">
+            <a:schemeClr val="lt1"/>
+          </a:fontRef>
+        </p:style>
+        <p:txBody>
+          <a:bodyPr rtlCol="0" anchor="ctr"/>
+          <a:lstStyle/>
+          <a:p>
+            <a:pPr algn="ctr"/>
+            <a:endParaRPr lang="en-GB" sz="1808">
+              <a:solidFill>
+                <a:srgbClr val="95BFE5"/>
+              </a:solidFill>
+            </a:endParaRPr>
+          </a:p>
+        </p:txBody>
+      </p:sp>
+      <p:sp>
+        <p:nvSpPr>
+          <p:cNvPr id="4" name="Rectangle: Rounded Corners 3">
+            <a:extLst>
+              <a:ext uri="{FF2B5EF4-FFF2-40B4-BE49-F238E27FC236}">
+                <a16:creationId xmlns:a16="http://schemas.microsoft.com/office/drawing/2014/main" id="{CAC95C35-1B48-AA1E-545D-C3E97BCC7321}"/>
+              </a:ext>
+            </a:extLst>
+          </p:cNvPr>
+          <p:cNvSpPr/>
+          <p:nvPr/>
+        </p:nvSpPr>
+        <p:spPr>
+          <a:xfrm>
+            <a:off x="1175372" y="-6979"/>
+            <a:ext cx="4584078" cy="2516715"/>
+          </a:xfrm>
+          <a:prstGeom prst="roundRect">
+            <a:avLst>
+              <a:gd name="adj" fmla="val 0"/>
+            </a:avLst>
+          </a:prstGeom>
+          <a:solidFill>
+            <a:srgbClr val="FEC601"/>
+          </a:solidFill>
+          <a:ln w="101600">
+            <a:noFill/>
+          </a:ln>
+        </p:spPr>
+        <p:style>
+          <a:lnRef idx="2">
+            <a:schemeClr val="accent1">
+              <a:shade val="50000"/>
+            </a:schemeClr>
+          </a:lnRef>
+          <a:fillRef idx="1">
+            <a:schemeClr val="accent1"/>
+          </a:fillRef>
+          <a:effectRef idx="0">
+            <a:schemeClr val="accent1"/>
+          </a:effectRef>
+          <a:fontRef idx="minor">
+            <a:schemeClr val="lt1"/>
+          </a:fontRef>
+        </p:style>
+        <p:txBody>
+          <a:bodyPr rtlCol="0" anchor="ctr"/>
+          <a:lstStyle/>
+          <a:p>
+            <a:pPr algn="ctr"/>
+            <a:endParaRPr lang="en-GB" sz="1808">
+              <a:solidFill>
+                <a:srgbClr val="95BFE5"/>
+              </a:solidFill>
+            </a:endParaRPr>
+          </a:p>
+        </p:txBody>
+      </p:sp>
+      <p:sp>
+        <p:nvSpPr>
+          <p:cNvPr id="5" name="Rectangle: Rounded Corners 4">
+            <a:extLst>
+              <a:ext uri="{FF2B5EF4-FFF2-40B4-BE49-F238E27FC236}">
+                <a16:creationId xmlns:a16="http://schemas.microsoft.com/office/drawing/2014/main" id="{4035679B-9375-4A3B-9740-2D1E7E3D6445}"/>
+              </a:ext>
+            </a:extLst>
+          </p:cNvPr>
+          <p:cNvSpPr/>
+          <p:nvPr/>
+        </p:nvSpPr>
+        <p:spPr>
+          <a:xfrm>
+            <a:off x="0" y="2544866"/>
+            <a:ext cx="1138136" cy="1750564"/>
+          </a:xfrm>
+          <a:prstGeom prst="roundRect">
+            <a:avLst>
+              <a:gd name="adj" fmla="val 0"/>
+            </a:avLst>
+          </a:prstGeom>
+          <a:solidFill>
+            <a:srgbClr val="2364AA"/>
+          </a:solidFill>
+          <a:ln w="101600">
+            <a:noFill/>
+          </a:ln>
+        </p:spPr>
+        <p:style>
+          <a:lnRef idx="2">
+            <a:schemeClr val="accent1">
+              <a:shade val="50000"/>
+            </a:schemeClr>
+          </a:lnRef>
+          <a:fillRef idx="1">
+            <a:schemeClr val="accent1"/>
+          </a:fillRef>
+          <a:effectRef idx="0">
+            <a:schemeClr val="accent1"/>
+          </a:effectRef>
+          <a:fontRef idx="minor">
+            <a:schemeClr val="lt1"/>
+          </a:fontRef>
+        </p:style>
+        <p:txBody>
+          <a:bodyPr rtlCol="0" anchor="ctr"/>
+          <a:lstStyle/>
+          <a:p>
+            <a:pPr algn="ctr"/>
+            <a:endParaRPr lang="en-GB" sz="1808">
+              <a:solidFill>
+                <a:srgbClr val="95BFE5"/>
+              </a:solidFill>
+            </a:endParaRPr>
+          </a:p>
+        </p:txBody>
+      </p:sp>
+      <p:sp>
+        <p:nvSpPr>
+          <p:cNvPr id="3" name="TextBox 2">
+            <a:extLst>
+              <a:ext uri="{FF2B5EF4-FFF2-40B4-BE49-F238E27FC236}">
+                <a16:creationId xmlns:a16="http://schemas.microsoft.com/office/drawing/2014/main" id="{56BA9D04-7576-0017-8F07-92AFBC13D6A6}"/>
+              </a:ext>
+            </a:extLst>
+          </p:cNvPr>
+          <p:cNvSpPr txBox="1"/>
+          <p:nvPr/>
+        </p:nvSpPr>
+        <p:spPr>
+          <a:xfrm>
+            <a:off x="1155920" y="2351235"/>
+            <a:ext cx="4584078" cy="1200329"/>
+          </a:xfrm>
+          <a:prstGeom prst="rect">
+            <a:avLst/>
+          </a:prstGeom>
+          <a:noFill/>
+        </p:spPr>
+        <p:txBody>
+          <a:bodyPr wrap="square" rtlCol="0">
+            <a:spAutoFit/>
+          </a:bodyPr>
+          <a:lstStyle/>
+          <a:p>
+            <a:r>
+              <a:rPr lang="en-GB" sz="7200" b="1">
+                <a:solidFill>
+                  <a:schemeClr val="bg1"/>
+                </a:solidFill>
+                <a:latin typeface="Android Insomnia" pitchFamily="2" charset="-128"/>
+                <a:ea typeface="Android Insomnia" pitchFamily="2" charset="-128"/>
+                <a:cs typeface="Android Insomnia" pitchFamily="2" charset="-128"/>
+              </a:rPr>
+              <a:t>causeway</a:t>
+            </a:r>
+          </a:p>
+        </p:txBody>
+      </p:sp>
+      <p:sp>
+        <p:nvSpPr>
+          <p:cNvPr id="10" name="TextBox 9">
+            <a:extLst>
+              <a:ext uri="{FF2B5EF4-FFF2-40B4-BE49-F238E27FC236}">
+                <a16:creationId xmlns:a16="http://schemas.microsoft.com/office/drawing/2014/main" id="{C64F2FFB-CDB5-6BCD-6256-EE2A05FDCE17}"/>
+              </a:ext>
+            </a:extLst>
+          </p:cNvPr>
+          <p:cNvSpPr txBox="1"/>
+          <p:nvPr/>
+        </p:nvSpPr>
+        <p:spPr>
+          <a:xfrm>
+            <a:off x="-75188" y="1760070"/>
+            <a:ext cx="1336806" cy="830997"/>
+          </a:xfrm>
+          <a:prstGeom prst="rect">
+            <a:avLst/>
+          </a:prstGeom>
+          <a:noFill/>
+        </p:spPr>
+        <p:txBody>
+          <a:bodyPr wrap="square" rtlCol="0">
+            <a:spAutoFit/>
+          </a:bodyPr>
+          <a:lstStyle/>
+          <a:p>
+            <a:r>
+              <a:rPr lang="en-US" sz="4800" b="1">
+                <a:solidFill>
+                  <a:schemeClr val="bg1"/>
+                </a:solidFill>
+                <a:latin typeface="Android Insomnia" pitchFamily="2" charset="-128"/>
+                <a:ea typeface="Android Insomnia" pitchFamily="2" charset="-128"/>
+                <a:cs typeface="Android Insomnia" pitchFamily="2" charset="-128"/>
+              </a:rPr>
+              <a:t>asf</a:t>
+            </a:r>
+            <a:endParaRPr lang="en-GB" sz="4800" b="1">
+              <a:solidFill>
+                <a:schemeClr val="bg1"/>
+              </a:solidFill>
+              <a:latin typeface="Android Insomnia" pitchFamily="2" charset="-128"/>
+              <a:ea typeface="Android Insomnia" pitchFamily="2" charset="-128"/>
+              <a:cs typeface="Android Insomnia" pitchFamily="2" charset="-128"/>
+            </a:endParaRPr>
+          </a:p>
+        </p:txBody>
+      </p:sp>
+    </p:spTree>
+    <p:extLst>
+      <p:ext uri="{BB962C8B-B14F-4D97-AF65-F5344CB8AC3E}">
+        <p14:creationId xmlns:p14="http://schemas.microsoft.com/office/powerpoint/2010/main" val="2424248051"/>
+      </p:ext>
+    </p:extLst>
+  </p:cSld>
+  <p:clrMapOvr>
+    <a:masterClrMapping/>
+  </p:clrMapOvr>
+</p:sld>
+</file>
+
+<file path=ppt/slides/slide7.xml><?xml version="1.0" encoding="utf-8"?>
+<p:sld xmlns:a="http://schemas.openxmlformats.org/drawingml/2006/main" xmlns:r="http://schemas.openxmlformats.org/officeDocument/2006/relationships" xmlns:p="http://schemas.openxmlformats.org/presentationml/2006/main">
+  <p:cSld>
+    <p:spTree>
+      <p:nvGrpSpPr>
+        <p:cNvPr id="1" name=""/>
+        <p:cNvGrpSpPr/>
+        <p:nvPr/>
+      </p:nvGrpSpPr>
+      <p:grpSpPr>
+        <a:xfrm>
+          <a:off x="0" y="0"/>
+          <a:ext cx="0" cy="0"/>
+          <a:chOff x="0" y="0"/>
+          <a:chExt cx="0" cy="0"/>
+        </a:xfrm>
+      </p:grpSpPr>
+      <p:sp>
+        <p:nvSpPr>
+          <p:cNvPr id="12" name="Rectangle: Rounded Corners 11">
+            <a:extLst>
+              <a:ext uri="{FF2B5EF4-FFF2-40B4-BE49-F238E27FC236}">
+                <a16:creationId xmlns:a16="http://schemas.microsoft.com/office/drawing/2014/main" id="{A31F33E6-48C6-2F14-D301-2E0B7985B91A}"/>
+              </a:ext>
+            </a:extLst>
+          </p:cNvPr>
+          <p:cNvSpPr/>
+          <p:nvPr/>
+        </p:nvSpPr>
+        <p:spPr>
+          <a:xfrm>
+            <a:off x="0" y="0"/>
+            <a:ext cx="1138136" cy="2509736"/>
+          </a:xfrm>
+          <a:prstGeom prst="roundRect">
+            <a:avLst>
+              <a:gd name="adj" fmla="val 0"/>
+            </a:avLst>
+          </a:prstGeom>
+          <a:solidFill>
+            <a:srgbClr val="5AB1BB"/>
+          </a:solidFill>
+          <a:ln w="101600">
+            <a:noFill/>
+          </a:ln>
+        </p:spPr>
+        <p:style>
+          <a:lnRef idx="2">
+            <a:schemeClr val="accent1">
+              <a:shade val="50000"/>
+            </a:schemeClr>
+          </a:lnRef>
+          <a:fillRef idx="1">
+            <a:schemeClr val="accent1"/>
+          </a:fillRef>
+          <a:effectRef idx="0">
+            <a:schemeClr val="accent1"/>
+          </a:effectRef>
+          <a:fontRef idx="minor">
+            <a:schemeClr val="lt1"/>
+          </a:fontRef>
+        </p:style>
+        <p:txBody>
+          <a:bodyPr rtlCol="0" anchor="ctr"/>
+          <a:lstStyle/>
+          <a:p>
+            <a:pPr algn="ctr"/>
+            <a:endParaRPr lang="en-GB" sz="1808">
+              <a:solidFill>
+                <a:srgbClr val="95BFE5"/>
+              </a:solidFill>
+            </a:endParaRPr>
+          </a:p>
+        </p:txBody>
+      </p:sp>
+      <p:sp>
+        <p:nvSpPr>
+          <p:cNvPr id="6" name="Rectangle: Rounded Corners 5">
+            <a:extLst>
+              <a:ext uri="{FF2B5EF4-FFF2-40B4-BE49-F238E27FC236}">
+                <a16:creationId xmlns:a16="http://schemas.microsoft.com/office/drawing/2014/main" id="{FEC4D2F5-1B5F-8B94-75B0-128AD20C2F6A}"/>
+              </a:ext>
+            </a:extLst>
+          </p:cNvPr>
+          <p:cNvSpPr/>
+          <p:nvPr/>
+        </p:nvSpPr>
+        <p:spPr>
+          <a:xfrm>
+            <a:off x="1175372" y="2544866"/>
+            <a:ext cx="4584078" cy="1750564"/>
+          </a:xfrm>
+          <a:prstGeom prst="roundRect">
+            <a:avLst>
+              <a:gd name="adj" fmla="val 0"/>
+            </a:avLst>
+          </a:prstGeom>
+          <a:solidFill>
+            <a:srgbClr val="7A263A"/>
+          </a:solidFill>
+          <a:ln w="101600">
+            <a:noFill/>
+          </a:ln>
+        </p:spPr>
+        <p:style>
+          <a:lnRef idx="2">
+            <a:schemeClr val="accent1">
+              <a:shade val="50000"/>
+            </a:schemeClr>
+          </a:lnRef>
+          <a:fillRef idx="1">
+            <a:schemeClr val="accent1"/>
+          </a:fillRef>
+          <a:effectRef idx="0">
+            <a:schemeClr val="accent1"/>
+          </a:effectRef>
+          <a:fontRef idx="minor">
+            <a:schemeClr val="lt1"/>
+          </a:fontRef>
+        </p:style>
+        <p:txBody>
+          <a:bodyPr rtlCol="0" anchor="ctr"/>
+          <a:lstStyle/>
+          <a:p>
+            <a:pPr algn="ctr"/>
+            <a:endParaRPr lang="en-GB" sz="1808">
+              <a:solidFill>
+                <a:srgbClr val="95BFE5"/>
+              </a:solidFill>
+            </a:endParaRPr>
+          </a:p>
+        </p:txBody>
+      </p:sp>
+      <p:sp>
+        <p:nvSpPr>
+          <p:cNvPr id="4" name="Rectangle: Rounded Corners 3">
+            <a:extLst>
+              <a:ext uri="{FF2B5EF4-FFF2-40B4-BE49-F238E27FC236}">
+                <a16:creationId xmlns:a16="http://schemas.microsoft.com/office/drawing/2014/main" id="{CAC95C35-1B48-AA1E-545D-C3E97BCC7321}"/>
+              </a:ext>
+            </a:extLst>
+          </p:cNvPr>
+          <p:cNvSpPr/>
+          <p:nvPr/>
+        </p:nvSpPr>
+        <p:spPr>
+          <a:xfrm>
+            <a:off x="1175372" y="-6979"/>
+            <a:ext cx="4584078" cy="2516715"/>
+          </a:xfrm>
+          <a:prstGeom prst="roundRect">
+            <a:avLst>
+              <a:gd name="adj" fmla="val 0"/>
+            </a:avLst>
+          </a:prstGeom>
+          <a:solidFill>
+            <a:srgbClr val="FEC601"/>
+          </a:solidFill>
+          <a:ln w="101600">
+            <a:noFill/>
+          </a:ln>
+        </p:spPr>
+        <p:style>
+          <a:lnRef idx="2">
+            <a:schemeClr val="accent1">
+              <a:shade val="50000"/>
+            </a:schemeClr>
+          </a:lnRef>
+          <a:fillRef idx="1">
+            <a:schemeClr val="accent1"/>
+          </a:fillRef>
+          <a:effectRef idx="0">
+            <a:schemeClr val="accent1"/>
+          </a:effectRef>
+          <a:fontRef idx="minor">
+            <a:schemeClr val="lt1"/>
+          </a:fontRef>
+        </p:style>
+        <p:txBody>
+          <a:bodyPr rtlCol="0" anchor="ctr"/>
+          <a:lstStyle/>
+          <a:p>
+            <a:pPr algn="ctr"/>
+            <a:endParaRPr lang="en-GB" sz="1808">
+              <a:solidFill>
+                <a:srgbClr val="95BFE5"/>
+              </a:solidFill>
+            </a:endParaRPr>
+          </a:p>
+        </p:txBody>
+      </p:sp>
+      <p:sp>
+        <p:nvSpPr>
+          <p:cNvPr id="5" name="Rectangle: Rounded Corners 4">
+            <a:extLst>
+              <a:ext uri="{FF2B5EF4-FFF2-40B4-BE49-F238E27FC236}">
+                <a16:creationId xmlns:a16="http://schemas.microsoft.com/office/drawing/2014/main" id="{4035679B-9375-4A3B-9740-2D1E7E3D6445}"/>
+              </a:ext>
+            </a:extLst>
+          </p:cNvPr>
+          <p:cNvSpPr/>
+          <p:nvPr/>
+        </p:nvSpPr>
+        <p:spPr>
+          <a:xfrm>
+            <a:off x="0" y="2544866"/>
+            <a:ext cx="1138136" cy="1750564"/>
+          </a:xfrm>
+          <a:prstGeom prst="roundRect">
+            <a:avLst>
+              <a:gd name="adj" fmla="val 0"/>
+            </a:avLst>
+          </a:prstGeom>
+          <a:solidFill>
+            <a:srgbClr val="2364AA"/>
+          </a:solidFill>
+          <a:ln w="101600">
+            <a:noFill/>
+          </a:ln>
+        </p:spPr>
+        <p:style>
+          <a:lnRef idx="2">
+            <a:schemeClr val="accent1">
+              <a:shade val="50000"/>
+            </a:schemeClr>
+          </a:lnRef>
+          <a:fillRef idx="1">
+            <a:schemeClr val="accent1"/>
+          </a:fillRef>
+          <a:effectRef idx="0">
+            <a:schemeClr val="accent1"/>
+          </a:effectRef>
+          <a:fontRef idx="minor">
+            <a:schemeClr val="lt1"/>
+          </a:fontRef>
+        </p:style>
+        <p:txBody>
+          <a:bodyPr rtlCol="0" anchor="ctr"/>
+          <a:lstStyle/>
+          <a:p>
+            <a:pPr algn="ctr"/>
+            <a:endParaRPr lang="en-GB" sz="1808">
+              <a:solidFill>
+                <a:srgbClr val="95BFE5"/>
+              </a:solidFill>
+            </a:endParaRPr>
+          </a:p>
+        </p:txBody>
+      </p:sp>
+      <p:sp>
+        <p:nvSpPr>
+          <p:cNvPr id="3" name="TextBox 2">
+            <a:extLst>
+              <a:ext uri="{FF2B5EF4-FFF2-40B4-BE49-F238E27FC236}">
+                <a16:creationId xmlns:a16="http://schemas.microsoft.com/office/drawing/2014/main" id="{56BA9D04-7576-0017-8F07-92AFBC13D6A6}"/>
+              </a:ext>
+            </a:extLst>
+          </p:cNvPr>
+          <p:cNvSpPr txBox="1"/>
+          <p:nvPr/>
+        </p:nvSpPr>
+        <p:spPr>
+          <a:xfrm>
+            <a:off x="1155920" y="2351235"/>
+            <a:ext cx="4584078" cy="1200329"/>
+          </a:xfrm>
+          <a:prstGeom prst="rect">
+            <a:avLst/>
+          </a:prstGeom>
+          <a:noFill/>
+        </p:spPr>
+        <p:txBody>
+          <a:bodyPr wrap="square" rtlCol="0">
+            <a:spAutoFit/>
+          </a:bodyPr>
+          <a:lstStyle/>
+          <a:p>
+            <a:r>
+              <a:rPr lang="en-GB" sz="7200" b="1">
+                <a:solidFill>
+                  <a:schemeClr val="bg1"/>
+                </a:solidFill>
+                <a:latin typeface="Android Insomnia" pitchFamily="2" charset="-128"/>
+                <a:ea typeface="Android Insomnia" pitchFamily="2" charset="-128"/>
+                <a:cs typeface="Android Insomnia" pitchFamily="2" charset="-128"/>
+              </a:rPr>
+              <a:t>causeway</a:t>
+            </a:r>
+          </a:p>
+        </p:txBody>
+      </p:sp>
+      <p:sp>
+        <p:nvSpPr>
+          <p:cNvPr id="10" name="TextBox 9">
+            <a:extLst>
+              <a:ext uri="{FF2B5EF4-FFF2-40B4-BE49-F238E27FC236}">
+                <a16:creationId xmlns:a16="http://schemas.microsoft.com/office/drawing/2014/main" id="{C64F2FFB-CDB5-6BCD-6256-EE2A05FDCE17}"/>
+              </a:ext>
+            </a:extLst>
+          </p:cNvPr>
+          <p:cNvSpPr txBox="1"/>
+          <p:nvPr/>
+        </p:nvSpPr>
+        <p:spPr>
+          <a:xfrm>
+            <a:off x="-75188" y="1760070"/>
+            <a:ext cx="1336806" cy="830997"/>
+          </a:xfrm>
+          <a:prstGeom prst="rect">
+            <a:avLst/>
+          </a:prstGeom>
+          <a:noFill/>
+        </p:spPr>
+        <p:txBody>
+          <a:bodyPr wrap="square" rtlCol="0">
+            <a:spAutoFit/>
+          </a:bodyPr>
+          <a:lstStyle/>
+          <a:p>
+            <a:r>
+              <a:rPr lang="en-US" sz="4800" b="1">
+                <a:solidFill>
+                  <a:schemeClr val="bg1"/>
+                </a:solidFill>
+                <a:latin typeface="Android Insomnia" pitchFamily="2" charset="-128"/>
+                <a:ea typeface="Android Insomnia" pitchFamily="2" charset="-128"/>
+                <a:cs typeface="Android Insomnia" pitchFamily="2" charset="-128"/>
+              </a:rPr>
+              <a:t>asf</a:t>
+            </a:r>
+            <a:endParaRPr lang="en-GB" sz="4800" b="1">
+              <a:solidFill>
+                <a:schemeClr val="bg1"/>
+              </a:solidFill>
+              <a:latin typeface="Android Insomnia" pitchFamily="2" charset="-128"/>
+              <a:ea typeface="Android Insomnia" pitchFamily="2" charset="-128"/>
+              <a:cs typeface="Android Insomnia" pitchFamily="2" charset="-128"/>
+            </a:endParaRPr>
+          </a:p>
+        </p:txBody>
+      </p:sp>
+    </p:spTree>
+    <p:extLst>
+      <p:ext uri="{BB962C8B-B14F-4D97-AF65-F5344CB8AC3E}">
+        <p14:creationId xmlns:p14="http://schemas.microsoft.com/office/powerpoint/2010/main" val="1760134204"/>
       </p:ext>
     </p:extLst>
   </p:cSld>
@@ -8425,7 +8874,7 @@
         <p:spPr>
           <a:xfrm>
             <a:off x="0" y="0"/>
-            <a:ext cx="746069" cy="2006503"/>
+            <a:ext cx="695529" cy="2006503"/>
           </a:xfrm>
           <a:prstGeom prst="roundRect">
             <a:avLst>
@@ -8482,8 +8931,8 @@
         </p:nvSpPr>
         <p:spPr>
           <a:xfrm>
-            <a:off x="1332689" y="2965606"/>
-            <a:ext cx="4429005" cy="1328256"/>
+            <a:off x="1383957" y="2967174"/>
+            <a:ext cx="4375493" cy="1328256"/>
           </a:xfrm>
           <a:prstGeom prst="roundRect">
             <a:avLst>
@@ -8540,8 +8989,8 @@
         </p:nvSpPr>
         <p:spPr>
           <a:xfrm>
-            <a:off x="1332680" y="-6979"/>
-            <a:ext cx="4429004" cy="2015741"/>
+            <a:off x="1386190" y="-6979"/>
+            <a:ext cx="4375493" cy="2015741"/>
           </a:xfrm>
           <a:prstGeom prst="roundRect">
             <a:avLst>
@@ -8598,8 +9047,8 @@
         </p:nvSpPr>
         <p:spPr>
           <a:xfrm>
-            <a:off x="-3562" y="2958624"/>
-            <a:ext cx="746069" cy="1336806"/>
+            <a:off x="-3561" y="2958624"/>
+            <a:ext cx="699090" cy="1336806"/>
           </a:xfrm>
           <a:prstGeom prst="roundRect">
             <a:avLst>
@@ -8820,9 +9269,9 @@
           <p:nvPr/>
         </p:nvSpPr>
         <p:spPr>
-          <a:xfrm>
-            <a:off x="-46002" y="1519904"/>
-            <a:ext cx="1336806" cy="523220"/>
+          <a:xfrm rot="16200000">
+            <a:off x="-289194" y="904038"/>
+            <a:ext cx="1336806" cy="830997"/>
           </a:xfrm>
           <a:prstGeom prst="rect">
             <a:avLst/>
@@ -8836,7 +9285,7 @@
           <a:lstStyle/>
           <a:p>
             <a:r>
-              <a:rPr lang="en-GB" sz="2800" b="1">
+              <a:rPr lang="en-US" sz="4800" b="1">
                 <a:solidFill>
                   <a:schemeClr val="bg1"/>
                 </a:solidFill>
@@ -8844,7 +9293,18 @@
                 <a:ea typeface="Android Insomnia" pitchFamily="2" charset="-128"/>
                 <a:cs typeface="Android Insomnia" pitchFamily="2" charset="-128"/>
               </a:rPr>
-              <a:t>ASF</a:t>
+              <a:t>A</a:t>
+            </a:r>
+            <a:r>
+              <a:rPr lang="en-GB" sz="4800" b="1">
+                <a:solidFill>
+                  <a:schemeClr val="bg1"/>
+                </a:solidFill>
+                <a:latin typeface="Android Insomnia" pitchFamily="2" charset="-128"/>
+                <a:ea typeface="Android Insomnia" pitchFamily="2" charset="-128"/>
+                <a:cs typeface="Android Insomnia" pitchFamily="2" charset="-128"/>
+              </a:rPr>
+              <a:t>SF</a:t>
             </a:r>
           </a:p>
         </p:txBody>
@@ -8852,7 +9312,7 @@
     </p:spTree>
     <p:extLst>
       <p:ext uri="{BB962C8B-B14F-4D97-AF65-F5344CB8AC3E}">
-        <p14:creationId xmlns:p14="http://schemas.microsoft.com/office/powerpoint/2010/main" val="3556914970"/>
+        <p14:creationId xmlns:p14="http://schemas.microsoft.com/office/powerpoint/2010/main" val="4158817270"/>
       </p:ext>
     </p:extLst>
   </p:cSld>
@@ -8893,12 +9353,12 @@
         </p:nvSpPr>
         <p:spPr>
           <a:xfrm>
-            <a:off x="-1" y="-9238"/>
-            <a:ext cx="1392541" cy="2015741"/>
+            <a:off x="0" y="0"/>
+            <a:ext cx="746069" cy="2006503"/>
           </a:xfrm>
           <a:prstGeom prst="roundRect">
             <a:avLst>
-              <a:gd name="adj" fmla="val 7098"/>
+              <a:gd name="adj" fmla="val 10358"/>
             </a:avLst>
           </a:prstGeom>
           <a:solidFill>
@@ -8951,8 +9411,8 @@
         </p:nvSpPr>
         <p:spPr>
           <a:xfrm>
-            <a:off x="2132435" y="2965606"/>
-            <a:ext cx="3629259" cy="1328256"/>
+            <a:off x="1332689" y="2965606"/>
+            <a:ext cx="4429005" cy="1328256"/>
           </a:xfrm>
           <a:prstGeom prst="roundRect">
             <a:avLst>
@@ -9009,12 +9469,12 @@
         </p:nvSpPr>
         <p:spPr>
           <a:xfrm>
-            <a:off x="2132436" y="-6979"/>
-            <a:ext cx="3629247" cy="2015741"/>
+            <a:off x="1332680" y="-6979"/>
+            <a:ext cx="4429004" cy="2015741"/>
           </a:xfrm>
           <a:prstGeom prst="roundRect">
             <a:avLst>
-              <a:gd name="adj" fmla="val 7552"/>
+              <a:gd name="adj" fmla="val 3933"/>
             </a:avLst>
           </a:prstGeom>
           <a:solidFill>
@@ -9067,8 +9527,8 @@
         </p:nvSpPr>
         <p:spPr>
           <a:xfrm>
-            <a:off x="-3562" y="2958625"/>
-            <a:ext cx="1396102" cy="1336806"/>
+            <a:off x="-3562" y="2958624"/>
+            <a:ext cx="746069" cy="1336806"/>
           </a:xfrm>
           <a:prstGeom prst="roundRect">
             <a:avLst>
@@ -9290,8 +9750,8 @@
         </p:nvSpPr>
         <p:spPr>
           <a:xfrm>
-            <a:off x="-3562" y="1189178"/>
-            <a:ext cx="1536070" cy="923330"/>
+            <a:off x="-46002" y="1519904"/>
+            <a:ext cx="1336806" cy="523220"/>
           </a:xfrm>
           <a:prstGeom prst="rect">
             <a:avLst/>
@@ -9305,7 +9765,7 @@
           <a:lstStyle/>
           <a:p>
             <a:r>
-              <a:rPr lang="en-GB" sz="5400" b="1">
+              <a:rPr lang="en-GB" sz="2800" b="1">
                 <a:solidFill>
                   <a:schemeClr val="bg1"/>
                 </a:solidFill>
@@ -9321,7 +9781,7 @@
     </p:spTree>
     <p:extLst>
       <p:ext uri="{BB962C8B-B14F-4D97-AF65-F5344CB8AC3E}">
-        <p14:creationId xmlns:p14="http://schemas.microsoft.com/office/powerpoint/2010/main" val="1690582736"/>
+        <p14:creationId xmlns:p14="http://schemas.microsoft.com/office/powerpoint/2010/main" val="3556914970"/>
       </p:ext>
     </p:extLst>
   </p:cSld>

</xml_diff>